<commit_message>
Added live status info to telemetry
</commit_message>
<xml_diff>
--- a/ppt/telemetry.pptx
+++ b/ppt/telemetry.pptx
@@ -13,10 +13,15 @@
     <p:sldId id="261" r:id="rId7"/>
     <p:sldId id="263" r:id="rId8"/>
     <p:sldId id="264" r:id="rId9"/>
-    <p:sldId id="262" r:id="rId10"/>
-    <p:sldId id="265" r:id="rId11"/>
-    <p:sldId id="266" r:id="rId12"/>
-    <p:sldId id="267" r:id="rId13"/>
+    <p:sldId id="270" r:id="rId10"/>
+    <p:sldId id="269" r:id="rId11"/>
+    <p:sldId id="262" r:id="rId12"/>
+    <p:sldId id="265" r:id="rId13"/>
+    <p:sldId id="266" r:id="rId14"/>
+    <p:sldId id="267" r:id="rId15"/>
+    <p:sldId id="273" r:id="rId16"/>
+    <p:sldId id="271" r:id="rId17"/>
+    <p:sldId id="268" r:id="rId18"/>
   </p:sldIdLst>
   <p:sldSz cx="9144000" cy="6858000" type="screen4x3"/>
   <p:notesSz cx="6858000" cy="9144000"/>
@@ -255,7 +260,8 @@
           <a:p>
             <a:fld id="{B3DDD6CE-B4CA-9849-A277-1C61576CCDC3}" type="datetimeFigureOut">
               <a:rPr lang="en-US" smtClean="0"/>
-              <a:t>9/26/14</a:t>
+              <a:pPr/>
+              <a:t>9/28/14</a:t>
             </a:fld>
             <a:endParaRPr lang="en-US"/>
           </a:p>
@@ -1001,6 +1007,7 @@
           <a:p>
             <a:fld id="{DDF64682-8E3D-C441-8553-C5C742B32DE1}" type="slidenum">
               <a:rPr lang="en-US" smtClean="0"/>
+              <a:pPr/>
               <a:t>‹#›</a:t>
             </a:fld>
             <a:endParaRPr lang="en-US"/>
@@ -1124,7 +1131,8 @@
           <a:p>
             <a:fld id="{B3DDD6CE-B4CA-9849-A277-1C61576CCDC3}" type="datetimeFigureOut">
               <a:rPr lang="en-US" smtClean="0"/>
-              <a:t>9/26/14</a:t>
+              <a:pPr/>
+              <a:t>9/28/14</a:t>
             </a:fld>
             <a:endParaRPr lang="en-US"/>
           </a:p>
@@ -1166,6 +1174,7 @@
           <a:p>
             <a:fld id="{DDF64682-8E3D-C441-8553-C5C742B32DE1}" type="slidenum">
               <a:rPr lang="en-US" smtClean="0"/>
+              <a:pPr/>
               <a:t>‹#›</a:t>
             </a:fld>
             <a:endParaRPr lang="en-US"/>
@@ -1299,7 +1308,8 @@
           <a:p>
             <a:fld id="{B3DDD6CE-B4CA-9849-A277-1C61576CCDC3}" type="datetimeFigureOut">
               <a:rPr lang="en-US" smtClean="0"/>
-              <a:t>9/26/14</a:t>
+              <a:pPr/>
+              <a:t>9/28/14</a:t>
             </a:fld>
             <a:endParaRPr lang="en-US"/>
           </a:p>
@@ -1341,6 +1351,7 @@
           <a:p>
             <a:fld id="{DDF64682-8E3D-C441-8553-C5C742B32DE1}" type="slidenum">
               <a:rPr lang="en-US" smtClean="0"/>
+              <a:pPr/>
               <a:t>‹#›</a:t>
             </a:fld>
             <a:endParaRPr lang="en-US"/>
@@ -1469,7 +1480,8 @@
           <a:p>
             <a:fld id="{B3DDD6CE-B4CA-9849-A277-1C61576CCDC3}" type="datetimeFigureOut">
               <a:rPr lang="en-US" smtClean="0"/>
-              <a:t>9/26/14</a:t>
+              <a:pPr/>
+              <a:t>9/28/14</a:t>
             </a:fld>
             <a:endParaRPr lang="en-US"/>
           </a:p>
@@ -1492,6 +1504,7 @@
           <a:p>
             <a:fld id="{DDF64682-8E3D-C441-8553-C5C742B32DE1}" type="slidenum">
               <a:rPr lang="en-US" smtClean="0"/>
+              <a:pPr/>
               <a:t>‹#›</a:t>
             </a:fld>
             <a:endParaRPr lang="en-US"/>
@@ -1679,7 +1692,8 @@
           <a:p>
             <a:fld id="{B3DDD6CE-B4CA-9849-A277-1C61576CCDC3}" type="datetimeFigureOut">
               <a:rPr lang="en-US" smtClean="0"/>
-              <a:t>9/26/14</a:t>
+              <a:pPr/>
+              <a:t>9/28/14</a:t>
             </a:fld>
             <a:endParaRPr lang="en-US"/>
           </a:p>
@@ -2422,6 +2436,7 @@
           <a:p>
             <a:fld id="{DDF64682-8E3D-C441-8553-C5C742B32DE1}" type="slidenum">
               <a:rPr lang="en-US" smtClean="0"/>
+              <a:pPr/>
               <a:t>‹#›</a:t>
             </a:fld>
             <a:endParaRPr lang="en-US"/>
@@ -2493,7 +2508,8 @@
           <a:p>
             <a:fld id="{B3DDD6CE-B4CA-9849-A277-1C61576CCDC3}" type="datetimeFigureOut">
               <a:rPr lang="en-US" smtClean="0"/>
-              <a:t>9/26/14</a:t>
+              <a:pPr/>
+              <a:t>9/28/14</a:t>
             </a:fld>
             <a:endParaRPr lang="en-US"/>
           </a:p>
@@ -2535,6 +2551,7 @@
           <a:p>
             <a:fld id="{DDF64682-8E3D-C441-8553-C5C742B32DE1}" type="slidenum">
               <a:rPr lang="en-US" smtClean="0"/>
+              <a:pPr/>
               <a:t>‹#›</a:t>
             </a:fld>
             <a:endParaRPr lang="en-US"/>
@@ -2729,7 +2746,8 @@
           <a:p>
             <a:fld id="{B3DDD6CE-B4CA-9849-A277-1C61576CCDC3}" type="datetimeFigureOut">
               <a:rPr lang="en-US" smtClean="0"/>
-              <a:t>9/26/14</a:t>
+              <a:pPr/>
+              <a:t>9/28/14</a:t>
             </a:fld>
             <a:endParaRPr lang="en-US"/>
           </a:p>
@@ -2771,6 +2789,7 @@
           <a:p>
             <a:fld id="{DDF64682-8E3D-C441-8553-C5C742B32DE1}" type="slidenum">
               <a:rPr lang="en-US" smtClean="0"/>
+              <a:pPr/>
               <a:t>‹#›</a:t>
             </a:fld>
             <a:endParaRPr lang="en-US"/>
@@ -3052,7 +3071,8 @@
           <a:p>
             <a:fld id="{B3DDD6CE-B4CA-9849-A277-1C61576CCDC3}" type="datetimeFigureOut">
               <a:rPr lang="en-US" smtClean="0"/>
-              <a:t>9/26/14</a:t>
+              <a:pPr/>
+              <a:t>9/28/14</a:t>
             </a:fld>
             <a:endParaRPr lang="en-US"/>
           </a:p>
@@ -3075,6 +3095,7 @@
           <a:p>
             <a:fld id="{DDF64682-8E3D-C441-8553-C5C742B32DE1}" type="slidenum">
               <a:rPr lang="en-US" smtClean="0"/>
+              <a:pPr/>
               <a:t>‹#›</a:t>
             </a:fld>
             <a:endParaRPr lang="en-US"/>
@@ -3142,7 +3163,8 @@
           <a:p>
             <a:fld id="{B3DDD6CE-B4CA-9849-A277-1C61576CCDC3}" type="datetimeFigureOut">
               <a:rPr lang="en-US" smtClean="0"/>
-              <a:t>9/26/14</a:t>
+              <a:pPr/>
+              <a:t>9/28/14</a:t>
             </a:fld>
             <a:endParaRPr lang="en-US"/>
           </a:p>
@@ -3184,6 +3206,7 @@
           <a:p>
             <a:fld id="{DDF64682-8E3D-C441-8553-C5C742B32DE1}" type="slidenum">
               <a:rPr lang="en-US" smtClean="0"/>
+              <a:pPr/>
               <a:t>‹#›</a:t>
             </a:fld>
             <a:endParaRPr lang="en-US"/>
@@ -3659,7 +3682,8 @@
           <a:p>
             <a:fld id="{B3DDD6CE-B4CA-9849-A277-1C61576CCDC3}" type="datetimeFigureOut">
               <a:rPr lang="en-US" smtClean="0"/>
-              <a:t>9/26/14</a:t>
+              <a:pPr/>
+              <a:t>9/28/14</a:t>
             </a:fld>
             <a:endParaRPr lang="en-US"/>
           </a:p>
@@ -3682,6 +3706,7 @@
           <a:p>
             <a:fld id="{DDF64682-8E3D-C441-8553-C5C742B32DE1}" type="slidenum">
               <a:rPr lang="en-US" smtClean="0"/>
+              <a:pPr/>
               <a:t>‹#›</a:t>
             </a:fld>
             <a:endParaRPr lang="en-US"/>
@@ -4170,7 +4195,8 @@
           <a:p>
             <a:fld id="{B3DDD6CE-B4CA-9849-A277-1C61576CCDC3}" type="datetimeFigureOut">
               <a:rPr lang="en-US" smtClean="0"/>
-              <a:t>9/26/14</a:t>
+              <a:pPr/>
+              <a:t>9/28/14</a:t>
             </a:fld>
             <a:endParaRPr lang="en-US"/>
           </a:p>
@@ -4193,6 +4219,7 @@
           <a:p>
             <a:fld id="{DDF64682-8E3D-C441-8553-C5C742B32DE1}" type="slidenum">
               <a:rPr lang="en-US" smtClean="0"/>
+              <a:pPr/>
               <a:t>‹#›</a:t>
             </a:fld>
             <a:endParaRPr lang="en-US"/>
@@ -4415,7 +4442,8 @@
           <a:p>
             <a:fld id="{B3DDD6CE-B4CA-9849-A277-1C61576CCDC3}" type="datetimeFigureOut">
               <a:rPr lang="en-US" smtClean="0"/>
-              <a:t>9/26/14</a:t>
+              <a:pPr/>
+              <a:t>9/28/14</a:t>
             </a:fld>
             <a:endParaRPr lang="en-US"/>
           </a:p>
@@ -4691,6 +4719,7 @@
           <a:p>
             <a:fld id="{DDF64682-8E3D-C441-8553-C5C742B32DE1}" type="slidenum">
               <a:rPr lang="en-US" smtClean="0"/>
+              <a:pPr/>
               <a:t>‹#›</a:t>
             </a:fld>
             <a:endParaRPr lang="en-US"/>
@@ -5104,7 +5133,7 @@
           <a:p>
             <a:r>
               <a:rPr lang="en-US" dirty="0" smtClean="0"/>
-              <a:t>Architecture – New system</a:t>
+              <a:t>Old Network - Architecture</a:t>
             </a:r>
             <a:endParaRPr lang="en-US" dirty="0"/>
           </a:p>
@@ -5112,7 +5141,7 @@
       </p:sp>
       <p:pic>
         <p:nvPicPr>
-          <p:cNvPr id="4" name="Content Placeholder 3" descr="xtelemetry_arch.eps"/>
+          <p:cNvPr id="4" name="Content Placeholder 3" descr="old-telemetry-network-arch.eps"/>
           <p:cNvPicPr>
             <a:picLocks noGrp="1" noChangeAspect="1"/>
           </p:cNvPicPr>
@@ -5140,8 +5169,8 @@
         </mc:AlternateContent>
         <p:spPr>
           <a:xfrm>
-            <a:off x="1238250" y="2195512"/>
-            <a:ext cx="5905500" cy="3683000"/>
+            <a:off x="1093271" y="1600200"/>
+            <a:ext cx="6195457" cy="4873625"/>
           </a:xfrm>
         </p:spPr>
       </p:pic>
@@ -5187,7 +5216,7 @@
           <a:p>
             <a:r>
               <a:rPr lang="en-US" dirty="0" smtClean="0"/>
-              <a:t>Components</a:t>
+              <a:t>New System</a:t>
             </a:r>
             <a:endParaRPr lang="en-US" dirty="0"/>
           </a:p>
@@ -5206,170 +5235,71 @@
         <p:spPr/>
         <p:txBody>
           <a:bodyPr>
-            <a:normAutofit fontScale="70000" lnSpcReduction="20000"/>
+            <a:normAutofit fontScale="77500" lnSpcReduction="20000"/>
           </a:bodyPr>
           <a:lstStyle/>
           <a:p>
             <a:r>
               <a:rPr lang="en-US" dirty="0" smtClean="0"/>
-              <a:t>Typical components which go to make up a telemetry feed/stream.</a:t>
-            </a:r>
-          </a:p>
-          <a:p>
+              <a:t>The RCS subsystems – TCM, ICM, EMS, ERS, TMS, etc and other systems e.g. SCHED, implement specific providers for the various types of status feed.</a:t>
+            </a:r>
+          </a:p>
+          <a:p>
+            <a:r>
+              <a:rPr lang="en-US" dirty="0" smtClean="0"/>
+              <a:t>These providers act as the publishers which external clients attach to as subscribers.</a:t>
+            </a:r>
+          </a:p>
+          <a:p>
+            <a:r>
+              <a:rPr lang="en-US" dirty="0" smtClean="0"/>
+              <a:t>Internally a provider is part of the running system, i.e. there could be a line of code at the start of some important operation (X) where a call is made to a method which sends out an event notification to subscribers.</a:t>
+            </a:r>
+          </a:p>
+          <a:p>
+            <a:pPr lvl="1"/>
             <a:r>
               <a:rPr lang="en-US" dirty="0" err="1" smtClean="0"/>
-              <a:t>XProvider</a:t>
-            </a:r>
-            <a:r>
-              <a:rPr lang="en-US" dirty="0" smtClean="0"/>
-              <a:t> – publisher interface</a:t>
+              <a:t>startingOperationX(subs</a:t>
+            </a:r>
+            <a:r>
+              <a:rPr lang="en-US" dirty="0" smtClean="0"/>
+              <a:t>); // notify registered subscribers… </a:t>
+            </a:r>
+          </a:p>
+          <a:p>
+            <a:r>
+              <a:rPr lang="en-US" dirty="0" smtClean="0"/>
+              <a:t>It is unwise to have it make the publishing calls out to the clients directly, a slow receiver could potentially block a time-critical operation.</a:t>
+            </a:r>
+          </a:p>
+          <a:p>
+            <a:r>
+              <a:rPr lang="en-US" dirty="0" smtClean="0"/>
+              <a:t>A gateway is introduced to handle the direct publishing from the provider.</a:t>
             </a:r>
           </a:p>
           <a:p>
             <a:pPr lvl="1"/>
             <a:r>
               <a:rPr lang="en-US" dirty="0" smtClean="0"/>
-              <a:t>Typically has methods to add and remove subscribers</a:t>
-            </a:r>
-          </a:p>
-          <a:p>
-            <a:pPr lvl="2"/>
-            <a:r>
-              <a:rPr lang="en-US" dirty="0" err="1" smtClean="0"/>
-              <a:t>addXListener(xl</a:t>
-            </a:r>
-            <a:r>
-              <a:rPr lang="en-US" dirty="0" smtClean="0"/>
-              <a:t>), </a:t>
-            </a:r>
-            <a:r>
-              <a:rPr lang="en-US" dirty="0" err="1" smtClean="0"/>
-              <a:t>removeXListener(xl</a:t>
-            </a:r>
-            <a:r>
-              <a:rPr lang="en-US" dirty="0" smtClean="0"/>
-              <a:t>)</a:t>
-            </a:r>
-          </a:p>
-          <a:p>
-            <a:r>
-              <a:rPr lang="en-US" dirty="0" err="1" smtClean="0"/>
-              <a:t>XSource</a:t>
-            </a:r>
-            <a:r>
-              <a:rPr lang="en-US" dirty="0" smtClean="0"/>
-              <a:t> – an implementation of </a:t>
-            </a:r>
-            <a:r>
-              <a:rPr lang="en-US" dirty="0" err="1" smtClean="0"/>
-              <a:t>XProvider</a:t>
-            </a:r>
-            <a:endParaRPr lang="en-US" dirty="0" smtClean="0"/>
+              <a:t>Gateway acts as publisher to client</a:t>
+            </a:r>
           </a:p>
           <a:p>
             <a:pPr lvl="1"/>
             <a:r>
               <a:rPr lang="en-US" dirty="0" smtClean="0"/>
-              <a:t>This is probably a class which is an integral part of the running subsystem.</a:t>
-            </a:r>
-          </a:p>
-          <a:p>
-            <a:r>
-              <a:rPr lang="en-US" dirty="0" err="1" smtClean="0"/>
-              <a:t>XListener</a:t>
-            </a:r>
-            <a:r>
-              <a:rPr lang="en-US" dirty="0" smtClean="0"/>
-              <a:t> – listener </a:t>
-            </a:r>
-            <a:r>
-              <a:rPr lang="en-US" dirty="0" err="1" smtClean="0"/>
-              <a:t>inteface</a:t>
-            </a:r>
-            <a:endParaRPr lang="en-US" dirty="0" smtClean="0"/>
+              <a:t>Acts as client to real provider.</a:t>
+            </a:r>
           </a:p>
           <a:p>
             <a:pPr lvl="1"/>
             <a:r>
               <a:rPr lang="en-US" dirty="0" smtClean="0"/>
-              <a:t>Typically has callback methods like</a:t>
-            </a:r>
-          </a:p>
-          <a:p>
-            <a:pPr lvl="2"/>
-            <a:r>
-              <a:rPr lang="en-US" dirty="0" err="1" smtClean="0"/>
-              <a:t>xUpdated(Xstatus</a:t>
-            </a:r>
-            <a:r>
-              <a:rPr lang="en-US" dirty="0" smtClean="0"/>
-              <a:t>), </a:t>
-            </a:r>
-            <a:r>
-              <a:rPr lang="en-US" dirty="0" err="1" smtClean="0"/>
-              <a:t>xEventA</a:t>
-            </a:r>
-            <a:r>
-              <a:rPr lang="en-US" dirty="0" smtClean="0"/>
-              <a:t>(), </a:t>
-            </a:r>
-            <a:r>
-              <a:rPr lang="en-US" dirty="0" err="1" smtClean="0"/>
-              <a:t>xEventB</a:t>
-            </a:r>
-            <a:r>
-              <a:rPr lang="en-US" dirty="0" smtClean="0"/>
-              <a:t>(), etc</a:t>
-            </a:r>
-          </a:p>
-          <a:p>
-            <a:r>
-              <a:rPr lang="en-US" dirty="0" err="1" smtClean="0"/>
-              <a:t>XReceiver</a:t>
-            </a:r>
-            <a:r>
-              <a:rPr lang="en-US" dirty="0" smtClean="0"/>
-              <a:t> – an implementation of </a:t>
-            </a:r>
-            <a:r>
-              <a:rPr lang="en-US" dirty="0" err="1" smtClean="0"/>
-              <a:t>XListener</a:t>
-            </a:r>
-            <a:endParaRPr lang="en-US" dirty="0" smtClean="0"/>
-          </a:p>
-          <a:p>
-            <a:pPr lvl="1"/>
-            <a:r>
-              <a:rPr lang="en-US" dirty="0" smtClean="0"/>
-              <a:t>Could be a GUI component or logging class.</a:t>
-            </a:r>
-          </a:p>
-          <a:p>
-            <a:r>
-              <a:rPr lang="en-US" dirty="0" err="1" smtClean="0"/>
-              <a:t>XArchive</a:t>
-            </a:r>
-            <a:r>
-              <a:rPr lang="en-US" dirty="0" smtClean="0"/>
-              <a:t> – archive retrieval interface</a:t>
-            </a:r>
-          </a:p>
-          <a:p>
-            <a:pPr lvl="1"/>
-            <a:r>
-              <a:rPr lang="en-US" dirty="0" smtClean="0"/>
-              <a:t>Typically has methods to obtain historic status.</a:t>
-            </a:r>
-          </a:p>
-          <a:p>
-            <a:r>
-              <a:rPr lang="en-US" dirty="0" err="1" smtClean="0"/>
-              <a:t>XArchiveGateway</a:t>
-            </a:r>
-            <a:r>
-              <a:rPr lang="en-US" dirty="0" smtClean="0"/>
-              <a:t> – a class which implements all the interfaces and acts as both a publisher endpoint for remote clients to connect with and keeps the key activity of the source separate from its publishing commitments to avoid blocking.</a:t>
-            </a:r>
+              <a:t>Disconnects publisher from actual client.</a:t>
+            </a:r>
+            <a:endParaRPr lang="en-US" dirty="0"/>
           </a:p>
         </p:txBody>
       </p:sp>
@@ -5415,6 +5345,341 @@
           <a:p>
             <a:r>
               <a:rPr lang="en-US" dirty="0" smtClean="0"/>
+              <a:t>Architecture – New system</a:t>
+            </a:r>
+            <a:endParaRPr lang="en-US" dirty="0"/>
+          </a:p>
+        </p:txBody>
+      </p:sp>
+      <p:pic>
+        <p:nvPicPr>
+          <p:cNvPr id="4" name="Content Placeholder 3" descr="xtelemetry_arch.eps"/>
+          <p:cNvPicPr>
+            <a:picLocks noGrp="1" noChangeAspect="1"/>
+          </p:cNvPicPr>
+          <p:nvPr>
+            <p:ph sz="quarter" idx="1"/>
+          </p:nvPr>
+        </p:nvPicPr>
+        <mc:AlternateContent>
+          <mc:Choice xmlns:ma="http://schemas.microsoft.com/office/mac/drawingml/2008/main" Requires="ma">
+            <p:blipFill>
+              <a:blip r:embed="rId2"/>
+              <a:stretch>
+                <a:fillRect/>
+              </a:stretch>
+            </p:blipFill>
+          </mc:Choice>
+          <mc:Fallback>
+            <p:blipFill>
+              <a:blip r:embed="rId3"/>
+              <a:stretch>
+                <a:fillRect/>
+              </a:stretch>
+            </p:blipFill>
+          </mc:Fallback>
+        </mc:AlternateContent>
+        <p:spPr>
+          <a:xfrm>
+            <a:off x="1238250" y="2195512"/>
+            <a:ext cx="5905500" cy="3683000"/>
+          </a:xfrm>
+        </p:spPr>
+      </p:pic>
+    </p:spTree>
+  </p:cSld>
+  <p:clrMapOvr>
+    <a:masterClrMapping/>
+  </p:clrMapOvr>
+</p:sld>
+</file>
+
+<file path=ppt/slides/slide13.xml><?xml version="1.0" encoding="utf-8"?>
+<p:sld xmlns:a="http://schemas.openxmlformats.org/drawingml/2006/main" xmlns:r="http://schemas.openxmlformats.org/officeDocument/2006/relationships" xmlns:mc="http://schemas.openxmlformats.org/markup-compatibility/2006" xmlns:mv="urn:schemas-microsoft-com:mac:vml" xmlns:p="http://schemas.openxmlformats.org/presentationml/2006/main" mc:Ignorable="mv" mc:PreserveAttributes="mv:*">
+  <p:cSld>
+    <p:spTree>
+      <p:nvGrpSpPr>
+        <p:cNvPr id="1" name=""/>
+        <p:cNvGrpSpPr/>
+        <p:nvPr/>
+      </p:nvGrpSpPr>
+      <p:grpSpPr>
+        <a:xfrm>
+          <a:off x="0" y="0"/>
+          <a:ext cx="0" cy="0"/>
+          <a:chOff x="0" y="0"/>
+          <a:chExt cx="0" cy="0"/>
+        </a:xfrm>
+      </p:grpSpPr>
+      <p:sp>
+        <p:nvSpPr>
+          <p:cNvPr id="2" name="Title 1"/>
+          <p:cNvSpPr>
+            <a:spLocks noGrp="1"/>
+          </p:cNvSpPr>
+          <p:nvPr>
+            <p:ph type="title"/>
+          </p:nvPr>
+        </p:nvSpPr>
+        <p:spPr/>
+        <p:txBody>
+          <a:bodyPr/>
+          <a:lstStyle/>
+          <a:p>
+            <a:r>
+              <a:rPr lang="en-US" dirty="0" smtClean="0"/>
+              <a:t>Components</a:t>
+            </a:r>
+            <a:endParaRPr lang="en-US" dirty="0"/>
+          </a:p>
+        </p:txBody>
+      </p:sp>
+      <p:sp>
+        <p:nvSpPr>
+          <p:cNvPr id="3" name="Content Placeholder 2"/>
+          <p:cNvSpPr>
+            <a:spLocks noGrp="1"/>
+          </p:cNvSpPr>
+          <p:nvPr>
+            <p:ph sz="quarter" idx="1"/>
+          </p:nvPr>
+        </p:nvSpPr>
+        <p:spPr/>
+        <p:txBody>
+          <a:bodyPr>
+            <a:normAutofit fontScale="70000" lnSpcReduction="20000"/>
+          </a:bodyPr>
+          <a:lstStyle/>
+          <a:p>
+            <a:r>
+              <a:rPr lang="en-US" dirty="0" smtClean="0"/>
+              <a:t>Typical components which go to make up a telemetry feed/stream.</a:t>
+            </a:r>
+          </a:p>
+          <a:p>
+            <a:r>
+              <a:rPr lang="en-US" i="1" dirty="0" err="1" smtClean="0"/>
+              <a:t>XProvider</a:t>
+            </a:r>
+            <a:r>
+              <a:rPr lang="en-US" i="1" dirty="0" smtClean="0"/>
+              <a:t> </a:t>
+            </a:r>
+            <a:r>
+              <a:rPr lang="en-US" dirty="0" smtClean="0"/>
+              <a:t>– publisher interface</a:t>
+            </a:r>
+          </a:p>
+          <a:p>
+            <a:pPr lvl="1"/>
+            <a:r>
+              <a:rPr lang="en-US" dirty="0" smtClean="0"/>
+              <a:t>Typically has methods to add and remove subscribers</a:t>
+            </a:r>
+          </a:p>
+          <a:p>
+            <a:pPr lvl="2"/>
+            <a:r>
+              <a:rPr lang="en-US" dirty="0" err="1" smtClean="0"/>
+              <a:t>addXListener(xl</a:t>
+            </a:r>
+            <a:r>
+              <a:rPr lang="en-US" dirty="0" smtClean="0"/>
+              <a:t>), </a:t>
+            </a:r>
+            <a:r>
+              <a:rPr lang="en-US" dirty="0" err="1" smtClean="0"/>
+              <a:t>removeXListener(xl</a:t>
+            </a:r>
+            <a:r>
+              <a:rPr lang="en-US" dirty="0" smtClean="0"/>
+              <a:t>)</a:t>
+            </a:r>
+          </a:p>
+          <a:p>
+            <a:r>
+              <a:rPr lang="en-US" i="1" dirty="0" err="1" smtClean="0"/>
+              <a:t>XSource</a:t>
+            </a:r>
+            <a:r>
+              <a:rPr lang="en-US" i="1" dirty="0" smtClean="0"/>
+              <a:t> </a:t>
+            </a:r>
+            <a:r>
+              <a:rPr lang="en-US" dirty="0" smtClean="0"/>
+              <a:t>– an implementation of </a:t>
+            </a:r>
+            <a:r>
+              <a:rPr lang="en-US" i="1" dirty="0" err="1" smtClean="0"/>
+              <a:t>XProvider</a:t>
+            </a:r>
+            <a:endParaRPr lang="en-US" i="1" dirty="0" smtClean="0"/>
+          </a:p>
+          <a:p>
+            <a:pPr lvl="1"/>
+            <a:r>
+              <a:rPr lang="en-US" dirty="0" smtClean="0"/>
+              <a:t>This is probably a class which is an integral part of the running subsystem.</a:t>
+            </a:r>
+          </a:p>
+          <a:p>
+            <a:r>
+              <a:rPr lang="en-US" i="1" dirty="0" err="1" smtClean="0"/>
+              <a:t>XListener</a:t>
+            </a:r>
+            <a:r>
+              <a:rPr lang="en-US" i="1" dirty="0" smtClean="0"/>
+              <a:t> </a:t>
+            </a:r>
+            <a:r>
+              <a:rPr lang="en-US" dirty="0" smtClean="0"/>
+              <a:t>– listener </a:t>
+            </a:r>
+            <a:r>
+              <a:rPr lang="en-US" dirty="0" err="1" smtClean="0"/>
+              <a:t>inteface</a:t>
+            </a:r>
+            <a:endParaRPr lang="en-US" dirty="0" smtClean="0"/>
+          </a:p>
+          <a:p>
+            <a:pPr lvl="1"/>
+            <a:r>
+              <a:rPr lang="en-US" dirty="0" smtClean="0"/>
+              <a:t>Typically has callback methods like</a:t>
+            </a:r>
+          </a:p>
+          <a:p>
+            <a:pPr lvl="2"/>
+            <a:r>
+              <a:rPr lang="en-US" dirty="0" err="1" smtClean="0"/>
+              <a:t>xUpdated(Xstatus</a:t>
+            </a:r>
+            <a:r>
+              <a:rPr lang="en-US" dirty="0" smtClean="0"/>
+              <a:t>), </a:t>
+            </a:r>
+            <a:r>
+              <a:rPr lang="en-US" dirty="0" err="1" smtClean="0"/>
+              <a:t>xEventA</a:t>
+            </a:r>
+            <a:r>
+              <a:rPr lang="en-US" dirty="0" smtClean="0"/>
+              <a:t>(), </a:t>
+            </a:r>
+            <a:r>
+              <a:rPr lang="en-US" dirty="0" err="1" smtClean="0"/>
+              <a:t>xEventB</a:t>
+            </a:r>
+            <a:r>
+              <a:rPr lang="en-US" dirty="0" smtClean="0"/>
+              <a:t>(), etc</a:t>
+            </a:r>
+          </a:p>
+          <a:p>
+            <a:r>
+              <a:rPr lang="en-US" i="1" dirty="0" err="1" smtClean="0"/>
+              <a:t>XReceiver</a:t>
+            </a:r>
+            <a:r>
+              <a:rPr lang="en-US" i="1" dirty="0" smtClean="0"/>
+              <a:t> </a:t>
+            </a:r>
+            <a:r>
+              <a:rPr lang="en-US" dirty="0" smtClean="0"/>
+              <a:t>– an implementation of </a:t>
+            </a:r>
+            <a:r>
+              <a:rPr lang="en-US" i="1" dirty="0" err="1" smtClean="0"/>
+              <a:t>XListener</a:t>
+            </a:r>
+            <a:endParaRPr lang="en-US" i="1" dirty="0" smtClean="0"/>
+          </a:p>
+          <a:p>
+            <a:pPr lvl="1"/>
+            <a:r>
+              <a:rPr lang="en-US" dirty="0" smtClean="0"/>
+              <a:t>Could be a GUI component or logging class.</a:t>
+            </a:r>
+          </a:p>
+          <a:p>
+            <a:r>
+              <a:rPr lang="en-US" i="1" dirty="0" err="1" smtClean="0"/>
+              <a:t>XArchive</a:t>
+            </a:r>
+            <a:r>
+              <a:rPr lang="en-US" i="1" dirty="0" smtClean="0"/>
+              <a:t> </a:t>
+            </a:r>
+            <a:r>
+              <a:rPr lang="en-US" dirty="0" smtClean="0"/>
+              <a:t>– archive retrieval interface</a:t>
+            </a:r>
+          </a:p>
+          <a:p>
+            <a:pPr lvl="1"/>
+            <a:r>
+              <a:rPr lang="en-US" dirty="0" smtClean="0"/>
+              <a:t>Typically has methods to obtain historic status.</a:t>
+            </a:r>
+          </a:p>
+          <a:p>
+            <a:r>
+              <a:rPr lang="en-US" i="1" dirty="0" err="1" smtClean="0"/>
+              <a:t>XArchiveGateway</a:t>
+            </a:r>
+            <a:r>
+              <a:rPr lang="en-US" i="1" dirty="0" smtClean="0"/>
+              <a:t> </a:t>
+            </a:r>
+            <a:r>
+              <a:rPr lang="en-US" dirty="0" smtClean="0"/>
+              <a:t>– a class which implements all the interfaces and acts as both a publisher endpoint for remote clients to connect with and keeps the key activity of the source separate from its publishing commitments to avoid blocking.</a:t>
+            </a:r>
+          </a:p>
+        </p:txBody>
+      </p:sp>
+    </p:spTree>
+  </p:cSld>
+  <p:clrMapOvr>
+    <a:masterClrMapping/>
+  </p:clrMapOvr>
+</p:sld>
+</file>
+
+<file path=ppt/slides/slide14.xml><?xml version="1.0" encoding="utf-8"?>
+<p:sld xmlns:a="http://schemas.openxmlformats.org/drawingml/2006/main" xmlns:r="http://schemas.openxmlformats.org/officeDocument/2006/relationships" xmlns:mc="http://schemas.openxmlformats.org/markup-compatibility/2006" xmlns:mv="urn:schemas-microsoft-com:mac:vml" xmlns:p="http://schemas.openxmlformats.org/presentationml/2006/main" mc:Ignorable="mv" mc:PreserveAttributes="mv:*">
+  <p:cSld>
+    <p:spTree>
+      <p:nvGrpSpPr>
+        <p:cNvPr id="1" name=""/>
+        <p:cNvGrpSpPr/>
+        <p:nvPr/>
+      </p:nvGrpSpPr>
+      <p:grpSpPr>
+        <a:xfrm>
+          <a:off x="0" y="0"/>
+          <a:ext cx="0" cy="0"/>
+          <a:chOff x="0" y="0"/>
+          <a:chExt cx="0" cy="0"/>
+        </a:xfrm>
+      </p:grpSpPr>
+      <p:sp>
+        <p:nvSpPr>
+          <p:cNvPr id="2" name="Title 1"/>
+          <p:cNvSpPr>
+            <a:spLocks noGrp="1"/>
+          </p:cNvSpPr>
+          <p:nvPr>
+            <p:ph type="title"/>
+          </p:nvPr>
+        </p:nvSpPr>
+        <p:spPr/>
+        <p:txBody>
+          <a:bodyPr/>
+          <a:lstStyle/>
+          <a:p>
+            <a:r>
+              <a:rPr lang="en-US" dirty="0" smtClean="0"/>
               <a:t>Example</a:t>
             </a:r>
             <a:endParaRPr lang="en-US" dirty="0"/>
@@ -5443,16 +5708,141 @@
           </a:p>
           <a:p>
             <a:r>
+              <a:rPr lang="en-US" i="1" dirty="0" err="1" smtClean="0"/>
+              <a:t>BasicTelescope</a:t>
+            </a:r>
+            <a:r>
+              <a:rPr lang="en-US" i="1" dirty="0" smtClean="0"/>
+              <a:t> </a:t>
+            </a:r>
+            <a:r>
+              <a:rPr lang="en-US" dirty="0" smtClean="0"/>
+              <a:t>is the primary publisher and implements </a:t>
+            </a:r>
+            <a:r>
+              <a:rPr lang="en-US" i="1" dirty="0" err="1" smtClean="0"/>
+              <a:t>TelescopeStatusProvider</a:t>
+            </a:r>
+            <a:r>
+              <a:rPr lang="en-US" dirty="0" smtClean="0"/>
+              <a:t>.</a:t>
+            </a:r>
+          </a:p>
+          <a:p>
+            <a:r>
+              <a:rPr lang="en-US" dirty="0" smtClean="0"/>
+              <a:t>It is also the class which collates status from the TCS and Autoguider.</a:t>
+            </a:r>
+          </a:p>
+          <a:p>
+            <a:r>
+              <a:rPr lang="en-US" i="1" dirty="0" err="1" smtClean="0"/>
+              <a:t>TelescopeArchiveGateway</a:t>
+            </a:r>
+            <a:r>
+              <a:rPr lang="en-US" i="1" dirty="0" smtClean="0"/>
+              <a:t> </a:t>
+            </a:r>
+            <a:r>
+              <a:rPr lang="en-US" dirty="0" smtClean="0"/>
+              <a:t>subscribes to Telescope as a listener. It stores the received statuses and then posts these out to real clients under control of a processing thread.</a:t>
+            </a:r>
+            <a:endParaRPr lang="en-US" dirty="0"/>
+          </a:p>
+        </p:txBody>
+      </p:sp>
+    </p:spTree>
+  </p:cSld>
+  <p:clrMapOvr>
+    <a:masterClrMapping/>
+  </p:clrMapOvr>
+</p:sld>
+</file>
+
+<file path=ppt/slides/slide15.xml><?xml version="1.0" encoding="utf-8"?>
+<p:sld xmlns:a="http://schemas.openxmlformats.org/drawingml/2006/main" xmlns:r="http://schemas.openxmlformats.org/officeDocument/2006/relationships" xmlns:mc="http://schemas.openxmlformats.org/markup-compatibility/2006" xmlns:mv="urn:schemas-microsoft-com:mac:vml" xmlns:p="http://schemas.openxmlformats.org/presentationml/2006/main" mc:Ignorable="mv" mc:PreserveAttributes="mv:*">
+  <p:cSld>
+    <p:spTree>
+      <p:nvGrpSpPr>
+        <p:cNvPr id="1" name=""/>
+        <p:cNvGrpSpPr/>
+        <p:nvPr/>
+      </p:nvGrpSpPr>
+      <p:grpSpPr>
+        <a:xfrm>
+          <a:off x="0" y="0"/>
+          <a:ext cx="0" cy="0"/>
+          <a:chOff x="0" y="0"/>
+          <a:chExt cx="0" cy="0"/>
+        </a:xfrm>
+      </p:grpSpPr>
+      <p:sp>
+        <p:nvSpPr>
+          <p:cNvPr id="2" name="Title 1"/>
+          <p:cNvSpPr>
+            <a:spLocks noGrp="1"/>
+          </p:cNvSpPr>
+          <p:nvPr>
+            <p:ph type="title"/>
+          </p:nvPr>
+        </p:nvSpPr>
+        <p:spPr/>
+        <p:txBody>
+          <a:bodyPr/>
+          <a:lstStyle/>
+          <a:p>
+            <a:r>
+              <a:rPr lang="en-US" dirty="0" smtClean="0"/>
+              <a:t>New Telemetry System</a:t>
+            </a:r>
+            <a:endParaRPr lang="en-US" dirty="0"/>
+          </a:p>
+        </p:txBody>
+      </p:sp>
+      <p:sp>
+        <p:nvSpPr>
+          <p:cNvPr id="3" name="Content Placeholder 2"/>
+          <p:cNvSpPr>
+            <a:spLocks noGrp="1"/>
+          </p:cNvSpPr>
+          <p:nvPr>
+            <p:ph sz="quarter" idx="1"/>
+          </p:nvPr>
+        </p:nvSpPr>
+        <p:spPr/>
+        <p:txBody>
+          <a:bodyPr/>
+          <a:lstStyle/>
+          <a:p>
+            <a:r>
+              <a:rPr lang="en-US" dirty="0" smtClean="0"/>
+              <a:t>Ideally all network telemetry should be via the new pub-sub system.</a:t>
+            </a:r>
+          </a:p>
+          <a:p>
+            <a:r>
+              <a:rPr lang="en-US" dirty="0" smtClean="0"/>
+              <a:t>RCS, </a:t>
+            </a:r>
+            <a:r>
               <a:rPr lang="en-US" dirty="0" err="1" smtClean="0"/>
-              <a:t>BasicTelescope</a:t>
-            </a:r>
-            <a:r>
-              <a:rPr lang="en-US" dirty="0" smtClean="0"/>
-              <a:t> is the primary publisher and implements </a:t>
+              <a:t>Sched</a:t>
+            </a:r>
+            <a:r>
+              <a:rPr lang="en-US" dirty="0" smtClean="0"/>
+              <a:t>, TEA, NSO all feeding to clients such as </a:t>
             </a:r>
             <a:r>
               <a:rPr lang="en-US" dirty="0" err="1" smtClean="0"/>
-              <a:t>TelescopeStatusProvider</a:t>
+              <a:t>OpsUI</a:t>
+            </a:r>
+            <a:r>
+              <a:rPr lang="en-US" dirty="0" smtClean="0"/>
+              <a:t> and </a:t>
+            </a:r>
+            <a:r>
+              <a:rPr lang="en-US" dirty="0" err="1" smtClean="0"/>
+              <a:t>LiveStatus</a:t>
             </a:r>
             <a:r>
               <a:rPr lang="en-US" dirty="0" smtClean="0"/>
@@ -5462,30 +5852,186 @@
           <a:p>
             <a:r>
               <a:rPr lang="en-US" dirty="0" smtClean="0"/>
-              <a:t>It is also the class which collates status from the TCS and Autoguider.</a:t>
-            </a:r>
-          </a:p>
-          <a:p>
-            <a:r>
-              <a:rPr lang="en-US" dirty="0" err="1" smtClean="0"/>
-              <a:t>TelescopeArchiveGateway</a:t>
-            </a:r>
-            <a:r>
-              <a:rPr lang="en-US" dirty="0" smtClean="0"/>
-              <a:t> subscribes to Telescope as a listener. It stores the received statuses and then posts these out to real clients under control of </a:t>
-            </a:r>
-            <a:r>
-              <a:rPr lang="en-US" smtClean="0"/>
-              <a:t>a processing </a:t>
-            </a:r>
-            <a:r>
-              <a:rPr lang="en-US" dirty="0" smtClean="0"/>
-              <a:t>thread.</a:t>
-            </a:r>
+              <a:t>Live Status is still however restricted to the old system but the source providers are now linked to the normal pub-sub feeds within RCS rather than collecting their own status info.</a:t>
+            </a:r>
+          </a:p>
+          <a:p>
+            <a:r>
+              <a:rPr lang="en-US" dirty="0" smtClean="0"/>
+              <a:t>E.g. Legacy Instrument providers are fed by the real ICM Instrument status providers. </a:t>
+            </a:r>
+          </a:p>
+          <a:p>
             <a:endParaRPr lang="en-US" dirty="0"/>
           </a:p>
         </p:txBody>
       </p:sp>
+    </p:spTree>
+  </p:cSld>
+  <p:clrMapOvr>
+    <a:masterClrMapping/>
+  </p:clrMapOvr>
+</p:sld>
+</file>
+
+<file path=ppt/slides/slide16.xml><?xml version="1.0" encoding="utf-8"?>
+<p:sld xmlns:a="http://schemas.openxmlformats.org/drawingml/2006/main" xmlns:r="http://schemas.openxmlformats.org/officeDocument/2006/relationships" xmlns:mc="http://schemas.openxmlformats.org/markup-compatibility/2006" xmlns:mv="urn:schemas-microsoft-com:mac:vml" xmlns:p="http://schemas.openxmlformats.org/presentationml/2006/main" mc:Ignorable="mv" mc:PreserveAttributes="mv:*">
+  <p:cSld>
+    <p:spTree>
+      <p:nvGrpSpPr>
+        <p:cNvPr id="1" name=""/>
+        <p:cNvGrpSpPr/>
+        <p:nvPr/>
+      </p:nvGrpSpPr>
+      <p:grpSpPr>
+        <a:xfrm>
+          <a:off x="0" y="0"/>
+          <a:ext cx="0" cy="0"/>
+          <a:chOff x="0" y="0"/>
+          <a:chExt cx="0" cy="0"/>
+        </a:xfrm>
+      </p:grpSpPr>
+      <p:sp>
+        <p:nvSpPr>
+          <p:cNvPr id="2" name="Title 1"/>
+          <p:cNvSpPr>
+            <a:spLocks noGrp="1"/>
+          </p:cNvSpPr>
+          <p:nvPr>
+            <p:ph type="title"/>
+          </p:nvPr>
+        </p:nvSpPr>
+        <p:spPr/>
+        <p:txBody>
+          <a:bodyPr/>
+          <a:lstStyle/>
+          <a:p>
+            <a:r>
+              <a:rPr lang="en-US" dirty="0" smtClean="0"/>
+              <a:t>New Telemetry System</a:t>
+            </a:r>
+            <a:endParaRPr lang="en-US" dirty="0"/>
+          </a:p>
+        </p:txBody>
+      </p:sp>
+      <p:pic>
+        <p:nvPicPr>
+          <p:cNvPr id="4" name="Content Placeholder 3" descr="new-telemetry-network-arch.eps"/>
+          <p:cNvPicPr>
+            <a:picLocks noGrp="1" noChangeAspect="1"/>
+          </p:cNvPicPr>
+          <p:nvPr>
+            <p:ph sz="quarter" idx="1"/>
+          </p:nvPr>
+        </p:nvPicPr>
+        <mc:AlternateContent>
+          <mc:Choice xmlns:ma="http://schemas.microsoft.com/office/mac/drawingml/2008/main" Requires="ma">
+            <p:blipFill>
+              <a:blip r:embed="rId2"/>
+              <a:stretch>
+                <a:fillRect/>
+              </a:stretch>
+            </p:blipFill>
+          </mc:Choice>
+          <mc:Fallback>
+            <p:blipFill>
+              <a:blip r:embed="rId3"/>
+              <a:stretch>
+                <a:fillRect/>
+              </a:stretch>
+            </p:blipFill>
+          </mc:Fallback>
+        </mc:AlternateContent>
+        <p:spPr>
+          <a:xfrm>
+            <a:off x="1209310" y="1600200"/>
+            <a:ext cx="5963380" cy="4873625"/>
+          </a:xfrm>
+        </p:spPr>
+      </p:pic>
+    </p:spTree>
+  </p:cSld>
+  <p:clrMapOvr>
+    <a:masterClrMapping/>
+  </p:clrMapOvr>
+</p:sld>
+</file>
+
+<file path=ppt/slides/slide17.xml><?xml version="1.0" encoding="utf-8"?>
+<p:sld xmlns:a="http://schemas.openxmlformats.org/drawingml/2006/main" xmlns:r="http://schemas.openxmlformats.org/officeDocument/2006/relationships" xmlns:mc="http://schemas.openxmlformats.org/markup-compatibility/2006" xmlns:mv="urn:schemas-microsoft-com:mac:vml" xmlns:p="http://schemas.openxmlformats.org/presentationml/2006/main" mc:Ignorable="mv" mc:PreserveAttributes="mv:*">
+  <p:cSld>
+    <p:spTree>
+      <p:nvGrpSpPr>
+        <p:cNvPr id="1" name=""/>
+        <p:cNvGrpSpPr/>
+        <p:nvPr/>
+      </p:nvGrpSpPr>
+      <p:grpSpPr>
+        <a:xfrm>
+          <a:off x="0" y="0"/>
+          <a:ext cx="0" cy="0"/>
+          <a:chOff x="0" y="0"/>
+          <a:chExt cx="0" cy="0"/>
+        </a:xfrm>
+      </p:grpSpPr>
+      <p:sp>
+        <p:nvSpPr>
+          <p:cNvPr id="2" name="Title 1"/>
+          <p:cNvSpPr>
+            <a:spLocks noGrp="1"/>
+          </p:cNvSpPr>
+          <p:nvPr>
+            <p:ph type="title"/>
+          </p:nvPr>
+        </p:nvSpPr>
+        <p:spPr/>
+        <p:txBody>
+          <a:bodyPr/>
+          <a:lstStyle/>
+          <a:p>
+            <a:r>
+              <a:rPr lang="en-US" dirty="0" smtClean="0"/>
+              <a:t>Live Status</a:t>
+            </a:r>
+            <a:endParaRPr lang="en-US" dirty="0"/>
+          </a:p>
+        </p:txBody>
+      </p:sp>
+      <p:pic>
+        <p:nvPicPr>
+          <p:cNvPr id="6" name="Content Placeholder 5" descr="livestatusreq.eps"/>
+          <p:cNvPicPr>
+            <a:picLocks noGrp="1" noChangeAspect="1"/>
+          </p:cNvPicPr>
+          <p:nvPr>
+            <p:ph sz="quarter" idx="1"/>
+          </p:nvPr>
+        </p:nvPicPr>
+        <mc:AlternateContent>
+          <mc:Choice xmlns:ma="http://schemas.microsoft.com/office/mac/drawingml/2008/main" Requires="ma">
+            <p:blipFill>
+              <a:blip r:embed="rId2"/>
+              <a:stretch>
+                <a:fillRect/>
+              </a:stretch>
+            </p:blipFill>
+          </mc:Choice>
+          <mc:Fallback>
+            <p:blipFill>
+              <a:blip r:embed="rId3"/>
+              <a:stretch>
+                <a:fillRect/>
+              </a:stretch>
+            </p:blipFill>
+          </mc:Fallback>
+        </mc:AlternateContent>
+        <p:spPr>
+          <a:xfrm>
+            <a:off x="912961" y="1600200"/>
+            <a:ext cx="6556077" cy="4873625"/>
+          </a:xfrm>
+        </p:spPr>
+      </p:pic>
     </p:spTree>
   </p:cSld>
   <p:clrMapOvr>
@@ -6058,12 +6604,16 @@
               <a:t>The category parameter is extracted and used to obtain a reference to a </a:t>
             </a:r>
             <a:r>
-              <a:rPr lang="en-US" dirty="0" err="1" smtClean="0"/>
+              <a:rPr lang="en-US" i="1" dirty="0" err="1" smtClean="0"/>
               <a:t>StatusProvider</a:t>
             </a:r>
             <a:r>
-              <a:rPr lang="en-US" dirty="0" smtClean="0"/>
-              <a:t> (for that category) from the registry.</a:t>
+              <a:rPr lang="en-US" i="1" dirty="0" smtClean="0"/>
+              <a:t> </a:t>
+            </a:r>
+            <a:r>
+              <a:rPr lang="en-US" dirty="0" smtClean="0"/>
+              <a:t>(for that category) from the registry.</a:t>
             </a:r>
           </a:p>
           <a:p>
@@ -6085,12 +6635,16 @@
               <a:t>The </a:t>
             </a:r>
             <a:r>
-              <a:rPr lang="en-US" dirty="0" err="1" smtClean="0"/>
+              <a:rPr lang="en-US" i="1" dirty="0" err="1" smtClean="0"/>
               <a:t>StatusCategory</a:t>
             </a:r>
             <a:r>
-              <a:rPr lang="en-US" dirty="0" smtClean="0"/>
-              <a:t> object is packed into a GET_STATUS_DONE and sent back to the client.</a:t>
+              <a:rPr lang="en-US" i="1" dirty="0" smtClean="0"/>
+              <a:t> </a:t>
+            </a:r>
+            <a:r>
+              <a:rPr lang="en-US" dirty="0" smtClean="0"/>
+              <a:t>object is packed into a GET_STATUS_DONE and sent back to the client.</a:t>
             </a:r>
           </a:p>
           <a:p>
@@ -6337,22 +6891,30 @@
               <a:t>Implement </a:t>
             </a:r>
             <a:r>
-              <a:rPr lang="en-US" dirty="0" err="1" smtClean="0"/>
+              <a:rPr lang="en-US" i="1" dirty="0" err="1" smtClean="0"/>
               <a:t>StatusMonitorClient</a:t>
             </a:r>
             <a:r>
-              <a:rPr lang="en-US" dirty="0" smtClean="0"/>
-              <a:t> interface.</a:t>
-            </a:r>
-          </a:p>
-          <a:p>
-            <a:r>
-              <a:rPr lang="en-US" dirty="0" err="1" smtClean="0"/>
+              <a:rPr lang="en-US" i="1" dirty="0" smtClean="0"/>
+              <a:t> </a:t>
+            </a:r>
+            <a:r>
+              <a:rPr lang="en-US" dirty="0" smtClean="0"/>
+              <a:t>interface.</a:t>
+            </a:r>
+          </a:p>
+          <a:p>
+            <a:r>
+              <a:rPr lang="en-US" i="1" dirty="0" err="1" smtClean="0"/>
               <a:t>StatusMonitorThread</a:t>
             </a:r>
             <a:r>
-              <a:rPr lang="en-US" dirty="0" smtClean="0"/>
-              <a:t> associated with each</a:t>
+              <a:rPr lang="en-US" i="1" dirty="0" smtClean="0"/>
+              <a:t> </a:t>
+            </a:r>
+            <a:r>
+              <a:rPr lang="en-US" dirty="0" smtClean="0"/>
+              <a:t>associated with each</a:t>
             </a:r>
           </a:p>
           <a:p>
@@ -6365,18 +6927,22 @@
           <a:p>
             <a:pPr lvl="1"/>
             <a:r>
-              <a:rPr lang="en-US" dirty="0" err="1" smtClean="0"/>
+              <a:rPr lang="en-US" i="1" dirty="0" err="1" smtClean="0"/>
               <a:t>TcsStatusClient</a:t>
             </a:r>
             <a:r>
-              <a:rPr lang="en-US" dirty="0" smtClean="0"/>
-              <a:t> (per TCS  SHOW category).</a:t>
+              <a:rPr lang="en-US" i="1" dirty="0" smtClean="0"/>
+              <a:t> </a:t>
+            </a:r>
+            <a:r>
+              <a:rPr lang="en-US" dirty="0" smtClean="0"/>
+              <a:t>(per TCS  SHOW category).</a:t>
             </a:r>
           </a:p>
           <a:p>
             <a:pPr lvl="1"/>
             <a:r>
-              <a:rPr lang="en-US" dirty="0" err="1" smtClean="0"/>
+              <a:rPr lang="en-US" i="1" dirty="0" err="1" smtClean="0"/>
               <a:t>InstrumentStatusClient</a:t>
             </a:r>
             <a:r>
@@ -6387,12 +6953,16 @@
           <a:p>
             <a:pPr lvl="1"/>
             <a:r>
-              <a:rPr lang="en-US" dirty="0" err="1" smtClean="0"/>
+              <a:rPr lang="en-US" i="1" dirty="0" err="1" smtClean="0"/>
               <a:t>RCSInternalStatusClient</a:t>
             </a:r>
             <a:r>
-              <a:rPr lang="en-US" dirty="0" smtClean="0"/>
-              <a:t> (</a:t>
+              <a:rPr lang="en-US" i="1" dirty="0" smtClean="0"/>
+              <a:t> </a:t>
+            </a:r>
+            <a:r>
+              <a:rPr lang="en-US" dirty="0" smtClean="0"/>
+              <a:t>(</a:t>
             </a:r>
             <a:r>
               <a:rPr lang="en-US" dirty="0" err="1" smtClean="0"/>
@@ -6406,12 +6976,16 @@
           <a:p>
             <a:pPr lvl="1"/>
             <a:r>
-              <a:rPr lang="en-US" dirty="0" err="1" smtClean="0"/>
+              <a:rPr lang="en-US" i="1" dirty="0" err="1" smtClean="0"/>
               <a:t>URLStatusClient</a:t>
             </a:r>
             <a:r>
-              <a:rPr lang="en-US" dirty="0" smtClean="0"/>
-              <a:t> – reading from data files e.g. cloud, dust, </a:t>
+              <a:rPr lang="en-US" i="1" dirty="0" smtClean="0"/>
+              <a:t> </a:t>
+            </a:r>
+            <a:r>
+              <a:rPr lang="en-US" dirty="0" smtClean="0"/>
+              <a:t>– reading from data files e.g. cloud, dust, </a:t>
             </a:r>
             <a:r>
               <a:rPr lang="en-US" dirty="0" err="1" smtClean="0"/>
@@ -6433,7 +7007,15 @@
           <a:p>
             <a:r>
               <a:rPr lang="en-US" dirty="0" smtClean="0"/>
-              <a:t>Now all defunct.</a:t>
+              <a:t>Now</a:t>
+            </a:r>
+            <a:r>
+              <a:rPr lang="en-US" dirty="0" smtClean="0"/>
+              <a:t> ALL </a:t>
+            </a:r>
+            <a:r>
+              <a:rPr lang="en-US" dirty="0" smtClean="0"/>
+              <a:t>defunct.</a:t>
             </a:r>
           </a:p>
         </p:txBody>
@@ -6480,7 +7062,7 @@
           <a:p>
             <a:r>
               <a:rPr lang="en-US" dirty="0" smtClean="0"/>
-              <a:t>New System</a:t>
+              <a:t>Old Telemetry Network</a:t>
             </a:r>
             <a:endParaRPr lang="en-US" dirty="0"/>
           </a:p>
@@ -6498,75 +7080,74 @@
         </p:nvSpPr>
         <p:spPr/>
         <p:txBody>
-          <a:bodyPr>
-            <a:normAutofit fontScale="77500" lnSpcReduction="20000"/>
-          </a:bodyPr>
-          <a:lstStyle/>
-          <a:p>
-            <a:r>
-              <a:rPr lang="en-US" dirty="0" smtClean="0"/>
-              <a:t>The RCS subsystems – TCM, ICM, EMS, ERS, TMS, etc and other systems e.g. SCHED, implement specific providers for the various types of status feed.</a:t>
-            </a:r>
-          </a:p>
-          <a:p>
-            <a:r>
-              <a:rPr lang="en-US" dirty="0" smtClean="0"/>
-              <a:t>These providers act as the publishers which external clients attach to as subscribers.</a:t>
-            </a:r>
-          </a:p>
-          <a:p>
-            <a:r>
-              <a:rPr lang="en-US" dirty="0" smtClean="0"/>
-              <a:t>Internally a provider is part of the running system, i.e. there could be a line of code at the start of some important operation (X) where a call is made to a method which sends out an event notification to subscribers.</a:t>
-            </a:r>
-          </a:p>
-          <a:p>
-            <a:pPr lvl="1"/>
+          <a:bodyPr/>
+          <a:lstStyle/>
+          <a:p>
+            <a:r>
+              <a:rPr lang="en-US" dirty="0" smtClean="0"/>
+              <a:t>Old system uses a number of different mechanisms due to network restrictions.</a:t>
+            </a:r>
+          </a:p>
+          <a:p>
+            <a:r>
+              <a:rPr lang="en-US" dirty="0" smtClean="0"/>
+              <a:t>Server push from RCS to </a:t>
+            </a:r>
             <a:r>
               <a:rPr lang="en-US" dirty="0" err="1" smtClean="0"/>
-              <a:t>startingOperationX(subs</a:t>
-            </a:r>
-            <a:r>
-              <a:rPr lang="en-US" dirty="0" smtClean="0"/>
-              <a:t>); // notify registered subscribers… </a:t>
-            </a:r>
-          </a:p>
-          <a:p>
-            <a:r>
-              <a:rPr lang="en-US" dirty="0" smtClean="0"/>
-              <a:t>I</a:t>
-            </a:r>
-            <a:r>
-              <a:rPr lang="en-US" dirty="0" smtClean="0"/>
-              <a:t>t is unwise to have it make the publishing calls out to the clients directly, a slow receiver could potentially block a time-critical operation.</a:t>
-            </a:r>
-          </a:p>
-          <a:p>
-            <a:r>
-              <a:rPr lang="en-US" dirty="0" smtClean="0"/>
-              <a:t>A gateway is introduced to handle the direct publishing from the provider.</a:t>
-            </a:r>
-          </a:p>
-          <a:p>
-            <a:pPr lvl="1"/>
-            <a:r>
-              <a:rPr lang="en-US" dirty="0" smtClean="0"/>
-              <a:t>Gateway acts as publisher to client</a:t>
-            </a:r>
-          </a:p>
-          <a:p>
-            <a:pPr lvl="1"/>
-            <a:r>
-              <a:rPr lang="en-US" dirty="0" smtClean="0"/>
-              <a:t>Acts as client to real provider.</a:t>
-            </a:r>
-          </a:p>
-          <a:p>
-            <a:pPr lvl="1"/>
-            <a:r>
-              <a:rPr lang="en-US" dirty="0" smtClean="0"/>
-              <a:t>Disconnects publisher from actual client.</a:t>
-            </a:r>
+              <a:t>RcsGUI</a:t>
+            </a:r>
+            <a:r>
+              <a:rPr lang="en-US" dirty="0" smtClean="0"/>
+              <a:t> and TEA – a form of simple pub-sub.</a:t>
+            </a:r>
+          </a:p>
+          <a:p>
+            <a:r>
+              <a:rPr lang="en-US" dirty="0" smtClean="0"/>
+              <a:t>Client pull – various polled feeds from RCS to </a:t>
+            </a:r>
+            <a:r>
+              <a:rPr lang="en-US" dirty="0" err="1" smtClean="0"/>
+              <a:t>RcsGUI</a:t>
+            </a:r>
+            <a:r>
+              <a:rPr lang="en-US" dirty="0" smtClean="0"/>
+              <a:t>.</a:t>
+            </a:r>
+          </a:p>
+          <a:p>
+            <a:r>
+              <a:rPr lang="en-US" dirty="0" smtClean="0"/>
+              <a:t>UDP from </a:t>
+            </a:r>
+            <a:r>
+              <a:rPr lang="en-US" dirty="0" err="1" smtClean="0"/>
+              <a:t>LiveStatus</a:t>
+            </a:r>
+            <a:r>
+              <a:rPr lang="en-US" dirty="0" smtClean="0"/>
+              <a:t> requestor to </a:t>
+            </a:r>
+            <a:r>
+              <a:rPr lang="en-US" dirty="0" err="1" smtClean="0"/>
+              <a:t>LiveStatus</a:t>
+            </a:r>
+            <a:r>
+              <a:rPr lang="en-US" dirty="0" smtClean="0"/>
+              <a:t> receiver.</a:t>
+            </a:r>
+          </a:p>
+          <a:p>
+            <a:r>
+              <a:rPr lang="en-US" dirty="0" smtClean="0"/>
+              <a:t>A few pub-sub streams using new architecture. </a:t>
+            </a:r>
+          </a:p>
+          <a:p>
+            <a:endParaRPr lang="en-US" dirty="0" smtClean="0"/>
+          </a:p>
+          <a:p>
             <a:endParaRPr lang="en-US" dirty="0"/>
           </a:p>
         </p:txBody>

</xml_diff>

<commit_message>
Modified telemetry docs and figs
</commit_message>
<xml_diff>
--- a/ppt/telemetry.pptx
+++ b/ppt/telemetry.pptx
@@ -18,10 +18,15 @@
     <p:sldId id="262" r:id="rId12"/>
     <p:sldId id="265" r:id="rId13"/>
     <p:sldId id="266" r:id="rId14"/>
-    <p:sldId id="267" r:id="rId15"/>
-    <p:sldId id="273" r:id="rId16"/>
-    <p:sldId id="271" r:id="rId17"/>
-    <p:sldId id="268" r:id="rId18"/>
+    <p:sldId id="275" r:id="rId15"/>
+    <p:sldId id="274" r:id="rId16"/>
+    <p:sldId id="267" r:id="rId17"/>
+    <p:sldId id="273" r:id="rId18"/>
+    <p:sldId id="271" r:id="rId19"/>
+    <p:sldId id="268" r:id="rId20"/>
+    <p:sldId id="276" r:id="rId21"/>
+    <p:sldId id="277" r:id="rId22"/>
+    <p:sldId id="278" r:id="rId23"/>
   </p:sldIdLst>
   <p:sldSz cx="9144000" cy="6858000" type="screen4x3"/>
   <p:notesSz cx="6858000" cy="9144000"/>
@@ -261,7 +266,7 @@
             <a:fld id="{B3DDD6CE-B4CA-9849-A277-1C61576CCDC3}" type="datetimeFigureOut">
               <a:rPr lang="en-US" smtClean="0"/>
               <a:pPr/>
-              <a:t>9/28/14</a:t>
+              <a:t>10/1/14</a:t>
             </a:fld>
             <a:endParaRPr lang="en-US"/>
           </a:p>
@@ -1132,7 +1137,7 @@
             <a:fld id="{B3DDD6CE-B4CA-9849-A277-1C61576CCDC3}" type="datetimeFigureOut">
               <a:rPr lang="en-US" smtClean="0"/>
               <a:pPr/>
-              <a:t>9/28/14</a:t>
+              <a:t>10/1/14</a:t>
             </a:fld>
             <a:endParaRPr lang="en-US"/>
           </a:p>
@@ -1309,7 +1314,7 @@
             <a:fld id="{B3DDD6CE-B4CA-9849-A277-1C61576CCDC3}" type="datetimeFigureOut">
               <a:rPr lang="en-US" smtClean="0"/>
               <a:pPr/>
-              <a:t>9/28/14</a:t>
+              <a:t>10/1/14</a:t>
             </a:fld>
             <a:endParaRPr lang="en-US"/>
           </a:p>
@@ -1481,7 +1486,7 @@
             <a:fld id="{B3DDD6CE-B4CA-9849-A277-1C61576CCDC3}" type="datetimeFigureOut">
               <a:rPr lang="en-US" smtClean="0"/>
               <a:pPr/>
-              <a:t>9/28/14</a:t>
+              <a:t>10/1/14</a:t>
             </a:fld>
             <a:endParaRPr lang="en-US"/>
           </a:p>
@@ -1693,7 +1698,7 @@
             <a:fld id="{B3DDD6CE-B4CA-9849-A277-1C61576CCDC3}" type="datetimeFigureOut">
               <a:rPr lang="en-US" smtClean="0"/>
               <a:pPr/>
-              <a:t>9/28/14</a:t>
+              <a:t>10/1/14</a:t>
             </a:fld>
             <a:endParaRPr lang="en-US"/>
           </a:p>
@@ -2509,7 +2514,7 @@
             <a:fld id="{B3DDD6CE-B4CA-9849-A277-1C61576CCDC3}" type="datetimeFigureOut">
               <a:rPr lang="en-US" smtClean="0"/>
               <a:pPr/>
-              <a:t>9/28/14</a:t>
+              <a:t>10/1/14</a:t>
             </a:fld>
             <a:endParaRPr lang="en-US"/>
           </a:p>
@@ -2747,7 +2752,7 @@
             <a:fld id="{B3DDD6CE-B4CA-9849-A277-1C61576CCDC3}" type="datetimeFigureOut">
               <a:rPr lang="en-US" smtClean="0"/>
               <a:pPr/>
-              <a:t>9/28/14</a:t>
+              <a:t>10/1/14</a:t>
             </a:fld>
             <a:endParaRPr lang="en-US"/>
           </a:p>
@@ -3072,7 +3077,7 @@
             <a:fld id="{B3DDD6CE-B4CA-9849-A277-1C61576CCDC3}" type="datetimeFigureOut">
               <a:rPr lang="en-US" smtClean="0"/>
               <a:pPr/>
-              <a:t>9/28/14</a:t>
+              <a:t>10/1/14</a:t>
             </a:fld>
             <a:endParaRPr lang="en-US"/>
           </a:p>
@@ -3164,7 +3169,7 @@
             <a:fld id="{B3DDD6CE-B4CA-9849-A277-1C61576CCDC3}" type="datetimeFigureOut">
               <a:rPr lang="en-US" smtClean="0"/>
               <a:pPr/>
-              <a:t>9/28/14</a:t>
+              <a:t>10/1/14</a:t>
             </a:fld>
             <a:endParaRPr lang="en-US"/>
           </a:p>
@@ -3683,7 +3688,7 @@
             <a:fld id="{B3DDD6CE-B4CA-9849-A277-1C61576CCDC3}" type="datetimeFigureOut">
               <a:rPr lang="en-US" smtClean="0"/>
               <a:pPr/>
-              <a:t>9/28/14</a:t>
+              <a:t>10/1/14</a:t>
             </a:fld>
             <a:endParaRPr lang="en-US"/>
           </a:p>
@@ -4196,7 +4201,7 @@
             <a:fld id="{B3DDD6CE-B4CA-9849-A277-1C61576CCDC3}" type="datetimeFigureOut">
               <a:rPr lang="en-US" smtClean="0"/>
               <a:pPr/>
-              <a:t>9/28/14</a:t>
+              <a:t>10/1/14</a:t>
             </a:fld>
             <a:endParaRPr lang="en-US"/>
           </a:p>
@@ -4443,7 +4448,7 @@
             <a:fld id="{B3DDD6CE-B4CA-9849-A277-1C61576CCDC3}" type="datetimeFigureOut">
               <a:rPr lang="en-US" smtClean="0"/>
               <a:pPr/>
-              <a:t>9/28/14</a:t>
+              <a:t>10/1/14</a:t>
             </a:fld>
             <a:endParaRPr lang="en-US"/>
           </a:p>
@@ -5133,7 +5138,7 @@
           <a:p>
             <a:r>
               <a:rPr lang="en-US" dirty="0" smtClean="0"/>
-              <a:t>Old Network - Architecture</a:t>
+              <a:t>Network Architecture (Old)</a:t>
             </a:r>
             <a:endParaRPr lang="en-US" dirty="0"/>
           </a:p>
@@ -5453,8 +5458,28 @@
           <a:p>
             <a:r>
               <a:rPr lang="en-US" dirty="0" smtClean="0"/>
-              <a:t>Typical components which go to make up a telemetry feed/stream.</a:t>
-            </a:r>
+              <a:t>Typical components which go to make up a telemetry feed/stream</a:t>
+            </a:r>
+            <a:r>
+              <a:rPr lang="en-US" dirty="0" smtClean="0"/>
+              <a:t>.</a:t>
+            </a:r>
+          </a:p>
+          <a:p>
+            <a:pPr lvl="1"/>
+            <a:r>
+              <a:rPr lang="en-US" dirty="0" smtClean="0"/>
+              <a:t>Note: Substitute X for relevant acronym </a:t>
+            </a:r>
+            <a:r>
+              <a:rPr lang="en-US" dirty="0" err="1" smtClean="0"/>
+              <a:t>e.g</a:t>
+            </a:r>
+            <a:r>
+              <a:rPr lang="en-US" dirty="0" smtClean="0"/>
+              <a:t> Telescope, Scheduler, etc</a:t>
+            </a:r>
+            <a:endParaRPr lang="en-US" dirty="0" smtClean="0"/>
           </a:p>
           <a:p>
             <a:r>
@@ -5536,8 +5561,8 @@
               <a:t>– listener </a:t>
             </a:r>
             <a:r>
-              <a:rPr lang="en-US" dirty="0" err="1" smtClean="0"/>
-              <a:t>inteface</a:t>
+              <a:rPr lang="en-US" dirty="0" smtClean="0"/>
+              <a:t>interface</a:t>
             </a:r>
             <a:endParaRPr lang="en-US" dirty="0" smtClean="0"/>
           </a:p>
@@ -5633,8 +5658,13 @@
             </a:r>
             <a:r>
               <a:rPr lang="en-US" dirty="0" smtClean="0"/>
-              <a:t>– a class which implements all the interfaces and acts as both a publisher endpoint for remote clients to connect with and keeps the key activity of the source separate from its publishing commitments to avoid blocking.</a:t>
-            </a:r>
+              <a:t>– a class which implements all the interfaces and acts as both a publisher endpoint for remote clients to connect with and keeps the key activity of the source separate from its publishing commitments to avoid </a:t>
+            </a:r>
+            <a:r>
+              <a:rPr lang="en-US" dirty="0" smtClean="0"/>
+              <a:t>blocking as well as storing historic data.</a:t>
+            </a:r>
+            <a:endParaRPr lang="en-US" dirty="0" smtClean="0"/>
           </a:p>
         </p:txBody>
       </p:sp>
@@ -5680,77 +5710,47 @@
           <a:p>
             <a:r>
               <a:rPr lang="en-US" dirty="0" smtClean="0"/>
-              <a:t>Example</a:t>
+              <a:t>Archive gateway Architecture</a:t>
             </a:r>
             <a:endParaRPr lang="en-US" dirty="0"/>
           </a:p>
         </p:txBody>
       </p:sp>
-      <p:sp>
-        <p:nvSpPr>
-          <p:cNvPr id="3" name="Content Placeholder 2"/>
-          <p:cNvSpPr>
-            <a:spLocks noGrp="1"/>
-          </p:cNvSpPr>
+      <p:pic>
+        <p:nvPicPr>
+          <p:cNvPr id="4" name="Content Placeholder 3" descr="archive-gateway-internal-arch.eps"/>
+          <p:cNvPicPr>
+            <a:picLocks noGrp="1" noChangeAspect="1"/>
+          </p:cNvPicPr>
           <p:nvPr>
             <p:ph sz="quarter" idx="1"/>
           </p:nvPr>
-        </p:nvSpPr>
-        <p:spPr/>
-        <p:txBody>
-          <a:bodyPr/>
-          <a:lstStyle/>
-          <a:p>
-            <a:r>
-              <a:rPr lang="en-US" dirty="0" smtClean="0"/>
-              <a:t>Telescope system telemetry feed.</a:t>
-            </a:r>
-          </a:p>
-          <a:p>
-            <a:r>
-              <a:rPr lang="en-US" i="1" dirty="0" err="1" smtClean="0"/>
-              <a:t>BasicTelescope</a:t>
-            </a:r>
-            <a:r>
-              <a:rPr lang="en-US" i="1" dirty="0" smtClean="0"/>
-              <a:t> </a:t>
-            </a:r>
-            <a:r>
-              <a:rPr lang="en-US" dirty="0" smtClean="0"/>
-              <a:t>is the primary publisher and implements </a:t>
-            </a:r>
-            <a:r>
-              <a:rPr lang="en-US" i="1" dirty="0" err="1" smtClean="0"/>
-              <a:t>TelescopeStatusProvider</a:t>
-            </a:r>
-            <a:r>
-              <a:rPr lang="en-US" dirty="0" smtClean="0"/>
-              <a:t>.</a:t>
-            </a:r>
-          </a:p>
-          <a:p>
-            <a:r>
-              <a:rPr lang="en-US" dirty="0" smtClean="0"/>
-              <a:t>It is also the class which collates status from the TCS and Autoguider.</a:t>
-            </a:r>
-          </a:p>
-          <a:p>
-            <a:r>
-              <a:rPr lang="en-US" i="1" dirty="0" err="1" smtClean="0"/>
-              <a:t>TelescopeArchiveGateway</a:t>
-            </a:r>
-            <a:r>
-              <a:rPr lang="en-US" i="1" dirty="0" smtClean="0"/>
-              <a:t> </a:t>
-            </a:r>
-            <a:r>
-              <a:rPr lang="en-US" dirty="0" smtClean="0"/>
-              <a:t>subscribes to Telescope as a listener. It stores the received statuses and then posts these out to real clients under control of a processing thread.</a:t>
-            </a:r>
-            <a:endParaRPr lang="en-US" dirty="0"/>
-          </a:p>
-        </p:txBody>
-      </p:sp>
+        </p:nvPicPr>
+        <mc:AlternateContent>
+          <mc:Choice xmlns:ma="http://schemas.microsoft.com/office/mac/drawingml/2008/main" Requires="ma">
+            <p:blipFill>
+              <a:blip r:embed="rId2"/>
+              <a:stretch>
+                <a:fillRect/>
+              </a:stretch>
+            </p:blipFill>
+          </mc:Choice>
+          <mc:Fallback>
+            <p:blipFill>
+              <a:blip r:embed="rId3"/>
+              <a:stretch>
+                <a:fillRect/>
+              </a:stretch>
+            </p:blipFill>
+          </mc:Fallback>
+        </mc:AlternateContent>
+        <p:spPr>
+          <a:xfrm>
+            <a:off x="1174767" y="1600200"/>
+            <a:ext cx="6032465" cy="4873625"/>
+          </a:xfrm>
+        </p:spPr>
+      </p:pic>
     </p:spTree>
   </p:cSld>
   <p:clrMapOvr>
@@ -5793,7 +5793,7 @@
           <a:p>
             <a:r>
               <a:rPr lang="en-US" dirty="0" smtClean="0"/>
-              <a:t>New Telemetry System</a:t>
+              <a:t>Telemetry Sources</a:t>
             </a:r>
             <a:endParaRPr lang="en-US" dirty="0"/>
           </a:p>
@@ -5811,55 +5811,156 @@
         </p:nvSpPr>
         <p:spPr/>
         <p:txBody>
-          <a:bodyPr/>
-          <a:lstStyle/>
-          <a:p>
-            <a:r>
-              <a:rPr lang="en-US" dirty="0" smtClean="0"/>
-              <a:t>Ideally all network telemetry should be via the new pub-sub system.</a:t>
-            </a:r>
-          </a:p>
-          <a:p>
-            <a:r>
-              <a:rPr lang="en-US" dirty="0" smtClean="0"/>
-              <a:t>RCS, </a:t>
-            </a:r>
+          <a:bodyPr>
+            <a:normAutofit fontScale="62500" lnSpcReduction="20000"/>
+          </a:bodyPr>
+          <a:lstStyle/>
+          <a:p>
             <a:r>
               <a:rPr lang="en-US" dirty="0" err="1" smtClean="0"/>
-              <a:t>Sched</a:t>
-            </a:r>
-            <a:r>
-              <a:rPr lang="en-US" dirty="0" smtClean="0"/>
-              <a:t>, TEA, NSO all feeding to clients such as </a:t>
-            </a:r>
+              <a:t>ngat.tcm.BasicTelescope</a:t>
+            </a:r>
+            <a:endParaRPr lang="en-US" dirty="0" smtClean="0"/>
+          </a:p>
+          <a:p>
+            <a:pPr lvl="1"/>
             <a:r>
               <a:rPr lang="en-US" dirty="0" err="1" smtClean="0"/>
-              <a:t>OpsUI</a:t>
-            </a:r>
-            <a:r>
-              <a:rPr lang="en-US" dirty="0" smtClean="0"/>
-              <a:t> and </a:t>
-            </a:r>
+              <a:t>TelescopeStatusProvider</a:t>
+            </a:r>
+            <a:endParaRPr lang="en-US" dirty="0" smtClean="0"/>
+          </a:p>
+          <a:p>
             <a:r>
               <a:rPr lang="en-US" dirty="0" err="1" smtClean="0"/>
-              <a:t>LiveStatus</a:t>
-            </a:r>
-            <a:r>
-              <a:rPr lang="en-US" dirty="0" smtClean="0"/>
-              <a:t>.</a:t>
-            </a:r>
-          </a:p>
-          <a:p>
-            <a:r>
-              <a:rPr lang="en-US" dirty="0" smtClean="0"/>
-              <a:t>Live Status is still however restricted to the old system but the source providers are now linked to the normal pub-sub feeds within RCS rather than collecting their own status info.</a:t>
-            </a:r>
-          </a:p>
-          <a:p>
-            <a:r>
-              <a:rPr lang="en-US" dirty="0" smtClean="0"/>
-              <a:t>E.g. Legacy Instrument providers are fed by the real ICM Instrument status providers. </a:t>
-            </a:r>
+              <a:t>ngat.icm.BasicInstrument</a:t>
+            </a:r>
+            <a:endParaRPr lang="en-US" dirty="0" smtClean="0"/>
+          </a:p>
+          <a:p>
+            <a:pPr lvl="1"/>
+            <a:r>
+              <a:rPr lang="en-US" dirty="0" err="1" smtClean="0"/>
+              <a:t>InstrumentStatusProvider</a:t>
+            </a:r>
+            <a:endParaRPr lang="en-US" dirty="0" smtClean="0"/>
+          </a:p>
+          <a:p>
+            <a:r>
+              <a:rPr lang="en-US" dirty="0" err="1" smtClean="0"/>
+              <a:t>ngat.ems.DefaultMutableSkyModel</a:t>
+            </a:r>
+            <a:endParaRPr lang="en-US" dirty="0" smtClean="0"/>
+          </a:p>
+          <a:p>
+            <a:pPr lvl="1"/>
+            <a:r>
+              <a:rPr lang="en-US" dirty="0" err="1" smtClean="0"/>
+              <a:t>SkyModel</a:t>
+            </a:r>
+            <a:endParaRPr lang="en-US" dirty="0" smtClean="0"/>
+          </a:p>
+          <a:p>
+            <a:r>
+              <a:rPr lang="en-US" dirty="0" err="1" smtClean="0"/>
+              <a:t>ngat.ems.BasicMeteorologyProvider</a:t>
+            </a:r>
+            <a:endParaRPr lang="en-US" dirty="0" smtClean="0"/>
+          </a:p>
+          <a:p>
+            <a:pPr lvl="1"/>
+            <a:r>
+              <a:rPr lang="en-US" dirty="0" err="1" smtClean="0"/>
+              <a:t>MeteorologyProvider</a:t>
+            </a:r>
+            <a:endParaRPr lang="en-US" dirty="0" smtClean="0"/>
+          </a:p>
+          <a:p>
+            <a:r>
+              <a:rPr lang="en-US" dirty="0" err="1" smtClean="0"/>
+              <a:t>ngat.sms.bds.BasicDespatchScheduler</a:t>
+            </a:r>
+            <a:endParaRPr lang="en-US" dirty="0" smtClean="0"/>
+          </a:p>
+          <a:p>
+            <a:pPr lvl="1"/>
+            <a:r>
+              <a:rPr lang="en-US" dirty="0" err="1" smtClean="0"/>
+              <a:t>ScheduleStatusProvider</a:t>
+            </a:r>
+            <a:endParaRPr lang="en-US" dirty="0" smtClean="0"/>
+          </a:p>
+          <a:p>
+            <a:r>
+              <a:rPr lang="en-US" dirty="0" err="1" smtClean="0"/>
+              <a:t>ngat.rcs.tms.BasicTaskMonitor</a:t>
+            </a:r>
+            <a:endParaRPr lang="en-US" dirty="0" smtClean="0"/>
+          </a:p>
+          <a:p>
+            <a:pPr lvl="1"/>
+            <a:r>
+              <a:rPr lang="en-US" dirty="0" err="1" smtClean="0"/>
+              <a:t>TaskMonitor</a:t>
+            </a:r>
+            <a:endParaRPr lang="en-US" dirty="0" smtClean="0"/>
+          </a:p>
+          <a:p>
+            <a:r>
+              <a:rPr lang="en-US" dirty="0" err="1" smtClean="0"/>
+              <a:t>ngat.rcs.newstatemodel.StandardStateModel</a:t>
+            </a:r>
+            <a:endParaRPr lang="en-US" dirty="0" smtClean="0"/>
+          </a:p>
+          <a:p>
+            <a:pPr lvl="1"/>
+            <a:r>
+              <a:rPr lang="en-US" dirty="0" smtClean="0"/>
+              <a:t>StateModel</a:t>
+            </a:r>
+          </a:p>
+          <a:p>
+            <a:r>
+              <a:rPr lang="en-US" dirty="0" err="1" smtClean="0"/>
+              <a:t>ngat.rcs.ops.OperationsManager</a:t>
+            </a:r>
+            <a:endParaRPr lang="en-US" dirty="0" smtClean="0"/>
+          </a:p>
+          <a:p>
+            <a:pPr lvl="1"/>
+            <a:r>
+              <a:rPr lang="en-US" dirty="0" err="1" smtClean="0"/>
+              <a:t>OperationsMonitor</a:t>
+            </a:r>
+            <a:endParaRPr lang="en-US" dirty="0" smtClean="0"/>
+          </a:p>
+          <a:p>
+            <a:r>
+              <a:rPr lang="en-US" dirty="0" smtClean="0"/>
+              <a:t>ngat.oss.impl.mysql.Phase2Model</a:t>
+            </a:r>
+          </a:p>
+          <a:p>
+            <a:pPr lvl="1"/>
+            <a:r>
+              <a:rPr lang="en-US" dirty="0" smtClean="0"/>
+              <a:t>Phase2Monitor</a:t>
+            </a:r>
+          </a:p>
+          <a:p>
+            <a:r>
+              <a:rPr lang="en-US" dirty="0" err="1" smtClean="0"/>
+              <a:t>ngat.oss.impl.mysql.AccountModel</a:t>
+            </a:r>
+            <a:endParaRPr lang="en-US" dirty="0" smtClean="0"/>
+          </a:p>
+          <a:p>
+            <a:pPr lvl="1"/>
+            <a:r>
+              <a:rPr lang="en-US" dirty="0" err="1" smtClean="0"/>
+              <a:t>AccountMonitor</a:t>
+            </a:r>
+            <a:endParaRPr lang="en-US" dirty="0" smtClean="0"/>
           </a:p>
           <a:p>
             <a:endParaRPr lang="en-US" dirty="0"/>
@@ -5908,47 +6009,93 @@
           <a:p>
             <a:r>
               <a:rPr lang="en-US" dirty="0" smtClean="0"/>
-              <a:t>New Telemetry System</a:t>
+              <a:t>Example</a:t>
             </a:r>
             <a:endParaRPr lang="en-US" dirty="0"/>
           </a:p>
         </p:txBody>
       </p:sp>
-      <p:pic>
-        <p:nvPicPr>
-          <p:cNvPr id="4" name="Content Placeholder 3" descr="new-telemetry-network-arch.eps"/>
-          <p:cNvPicPr>
-            <a:picLocks noGrp="1" noChangeAspect="1"/>
-          </p:cNvPicPr>
+      <p:sp>
+        <p:nvSpPr>
+          <p:cNvPr id="3" name="Content Placeholder 2"/>
+          <p:cNvSpPr>
+            <a:spLocks noGrp="1"/>
+          </p:cNvSpPr>
           <p:nvPr>
             <p:ph sz="quarter" idx="1"/>
           </p:nvPr>
-        </p:nvPicPr>
-        <mc:AlternateContent>
-          <mc:Choice xmlns:ma="http://schemas.microsoft.com/office/mac/drawingml/2008/main" Requires="ma">
-            <p:blipFill>
-              <a:blip r:embed="rId2"/>
-              <a:stretch>
-                <a:fillRect/>
-              </a:stretch>
-            </p:blipFill>
-          </mc:Choice>
-          <mc:Fallback>
-            <p:blipFill>
-              <a:blip r:embed="rId3"/>
-              <a:stretch>
-                <a:fillRect/>
-              </a:stretch>
-            </p:blipFill>
-          </mc:Fallback>
-        </mc:AlternateContent>
-        <p:spPr>
-          <a:xfrm>
-            <a:off x="1209310" y="1600200"/>
-            <a:ext cx="5963380" cy="4873625"/>
-          </a:xfrm>
-        </p:spPr>
-      </p:pic>
+        </p:nvSpPr>
+        <p:spPr/>
+        <p:txBody>
+          <a:bodyPr/>
+          <a:lstStyle/>
+          <a:p>
+            <a:r>
+              <a:rPr lang="en-US" dirty="0" smtClean="0"/>
+              <a:t>Telescope system telemetry feed.</a:t>
+            </a:r>
+          </a:p>
+          <a:p>
+            <a:r>
+              <a:rPr lang="en-US" i="1" dirty="0" err="1" smtClean="0"/>
+              <a:t>BasicTelescope</a:t>
+            </a:r>
+            <a:r>
+              <a:rPr lang="en-US" i="1" dirty="0" smtClean="0"/>
+              <a:t> </a:t>
+            </a:r>
+            <a:r>
+              <a:rPr lang="en-US" dirty="0" smtClean="0"/>
+              <a:t>is the primary publisher and implements </a:t>
+            </a:r>
+            <a:r>
+              <a:rPr lang="en-US" i="1" dirty="0" err="1" smtClean="0"/>
+              <a:t>TelescopeStatusProvider</a:t>
+            </a:r>
+            <a:r>
+              <a:rPr lang="en-US" dirty="0" smtClean="0"/>
+              <a:t>.</a:t>
+            </a:r>
+          </a:p>
+          <a:p>
+            <a:r>
+              <a:rPr lang="en-US" dirty="0" smtClean="0"/>
+              <a:t>It is the class which collates status from the TCS and Autoguider.</a:t>
+            </a:r>
+          </a:p>
+          <a:p>
+            <a:r>
+              <a:rPr lang="en-US" i="1" dirty="0" err="1" smtClean="0"/>
+              <a:t>TelescopeArchiveGateway</a:t>
+            </a:r>
+            <a:r>
+              <a:rPr lang="en-US" i="1" dirty="0" smtClean="0"/>
+              <a:t> </a:t>
+            </a:r>
+            <a:r>
+              <a:rPr lang="en-US" dirty="0" smtClean="0"/>
+              <a:t>subscribes to </a:t>
+            </a:r>
+            <a:r>
+              <a:rPr lang="en-US" i="1" dirty="0" smtClean="0"/>
+              <a:t>Telescope </a:t>
+            </a:r>
+            <a:r>
+              <a:rPr lang="en-US" dirty="0" smtClean="0"/>
+              <a:t>as a </a:t>
+            </a:r>
+            <a:r>
+              <a:rPr lang="en-US" i="1" dirty="0" err="1" smtClean="0"/>
+              <a:t>TelescopeStatusUpdateListener</a:t>
+            </a:r>
+            <a:r>
+              <a:rPr lang="en-US" dirty="0" smtClean="0"/>
+              <a:t>. It stores the received statuses and then posts these out to real clients under control of a processing thread.</a:t>
+            </a:r>
+            <a:endParaRPr lang="en-US" dirty="0"/>
+          </a:p>
+        </p:txBody>
+      </p:sp>
     </p:spTree>
   </p:cSld>
   <p:clrMapOvr>
@@ -5991,7 +6138,151 @@
           <a:p>
             <a:r>
               <a:rPr lang="en-US" dirty="0" smtClean="0"/>
-              <a:t>Live Status</a:t>
+              <a:t>Ideal </a:t>
+            </a:r>
+            <a:r>
+              <a:rPr lang="en-US" dirty="0" smtClean="0"/>
+              <a:t>Telemetry </a:t>
+            </a:r>
+            <a:r>
+              <a:rPr lang="en-US" dirty="0" smtClean="0"/>
+              <a:t>System</a:t>
+            </a:r>
+            <a:endParaRPr lang="en-US" dirty="0"/>
+          </a:p>
+        </p:txBody>
+      </p:sp>
+      <p:sp>
+        <p:nvSpPr>
+          <p:cNvPr id="3" name="Content Placeholder 2"/>
+          <p:cNvSpPr>
+            <a:spLocks noGrp="1"/>
+          </p:cNvSpPr>
+          <p:nvPr>
+            <p:ph sz="quarter" idx="1"/>
+          </p:nvPr>
+        </p:nvSpPr>
+        <p:spPr/>
+        <p:txBody>
+          <a:bodyPr/>
+          <a:lstStyle/>
+          <a:p>
+            <a:r>
+              <a:rPr lang="en-US" dirty="0" smtClean="0"/>
+              <a:t>Ideally all network telemetry should be via the new pub-sub</a:t>
+            </a:r>
+            <a:r>
+              <a:rPr lang="en-US" dirty="0" smtClean="0"/>
+              <a:t> </a:t>
+            </a:r>
+            <a:r>
+              <a:rPr lang="en-US" dirty="0" smtClean="0"/>
+              <a:t>feeds</a:t>
+            </a:r>
+            <a:r>
+              <a:rPr lang="en-US" dirty="0" smtClean="0"/>
+              <a:t>.</a:t>
+            </a:r>
+            <a:endParaRPr lang="en-US" dirty="0" smtClean="0"/>
+          </a:p>
+          <a:p>
+            <a:r>
+              <a:rPr lang="en-US" dirty="0" smtClean="0"/>
+              <a:t>RCS, </a:t>
+            </a:r>
+            <a:r>
+              <a:rPr lang="en-US" dirty="0" err="1" smtClean="0"/>
+              <a:t>Sched</a:t>
+            </a:r>
+            <a:r>
+              <a:rPr lang="en-US" dirty="0" smtClean="0"/>
+              <a:t>, TEA, </a:t>
+            </a:r>
+            <a:r>
+              <a:rPr lang="en-US" dirty="0" smtClean="0"/>
+              <a:t>NSO, OSS </a:t>
+            </a:r>
+            <a:r>
+              <a:rPr lang="en-US" dirty="0" smtClean="0"/>
+              <a:t>all feeding to clients such as </a:t>
+            </a:r>
+            <a:r>
+              <a:rPr lang="en-US" dirty="0" err="1" smtClean="0"/>
+              <a:t>OpsUI</a:t>
+            </a:r>
+            <a:r>
+              <a:rPr lang="en-US" dirty="0" smtClean="0"/>
+              <a:t> and </a:t>
+            </a:r>
+            <a:r>
+              <a:rPr lang="en-US" dirty="0" err="1" smtClean="0"/>
+              <a:t>LiveStatus</a:t>
+            </a:r>
+            <a:r>
+              <a:rPr lang="en-US" dirty="0" smtClean="0"/>
+              <a:t>.</a:t>
+            </a:r>
+          </a:p>
+          <a:p>
+            <a:r>
+              <a:rPr lang="en-US" dirty="0" smtClean="0"/>
+              <a:t>Live Status is still however restricted to the old system but the source providers are now linked to the normal pub-sub feeds within RCS rather than collecting their own status info.</a:t>
+            </a:r>
+          </a:p>
+          <a:p>
+            <a:r>
+              <a:rPr lang="en-US" dirty="0" smtClean="0"/>
+              <a:t>E.g. Legacy Instrument providers are fed by the real ICM Instrument status providers. </a:t>
+            </a:r>
+          </a:p>
+          <a:p>
+            <a:endParaRPr lang="en-US" dirty="0"/>
+          </a:p>
+        </p:txBody>
+      </p:sp>
+    </p:spTree>
+  </p:cSld>
+  <p:clrMapOvr>
+    <a:masterClrMapping/>
+  </p:clrMapOvr>
+</p:sld>
+</file>
+
+<file path=ppt/slides/slide18.xml><?xml version="1.0" encoding="utf-8"?>
+<p:sld xmlns:a="http://schemas.openxmlformats.org/drawingml/2006/main" xmlns:r="http://schemas.openxmlformats.org/officeDocument/2006/relationships" xmlns:mc="http://schemas.openxmlformats.org/markup-compatibility/2006" xmlns:mv="urn:schemas-microsoft-com:mac:vml" xmlns:p="http://schemas.openxmlformats.org/presentationml/2006/main" mc:Ignorable="mv" mc:PreserveAttributes="mv:*">
+  <p:cSld>
+    <p:spTree>
+      <p:nvGrpSpPr>
+        <p:cNvPr id="1" name=""/>
+        <p:cNvGrpSpPr/>
+        <p:nvPr/>
+      </p:nvGrpSpPr>
+      <p:grpSpPr>
+        <a:xfrm>
+          <a:off x="0" y="0"/>
+          <a:ext cx="0" cy="0"/>
+          <a:chOff x="0" y="0"/>
+          <a:chExt cx="0" cy="0"/>
+        </a:xfrm>
+      </p:grpSpPr>
+      <p:sp>
+        <p:nvSpPr>
+          <p:cNvPr id="2" name="Title 1"/>
+          <p:cNvSpPr>
+            <a:spLocks noGrp="1"/>
+          </p:cNvSpPr>
+          <p:nvPr>
+            <p:ph type="title"/>
+          </p:nvPr>
+        </p:nvSpPr>
+        <p:spPr/>
+        <p:txBody>
+          <a:bodyPr/>
+          <a:lstStyle/>
+          <a:p>
+            <a:r>
+              <a:rPr lang="en-US" dirty="0" smtClean="0"/>
+              <a:t>Network Architecture (Ideal)</a:t>
             </a:r>
             <a:endParaRPr lang="en-US" dirty="0"/>
           </a:p>
@@ -5999,7 +6290,98 @@
       </p:sp>
       <p:pic>
         <p:nvPicPr>
-          <p:cNvPr id="6" name="Content Placeholder 5" descr="livestatusreq.eps"/>
+          <p:cNvPr id="4" name="Content Placeholder 3" descr="new-telemetry-network-arch.eps"/>
+          <p:cNvPicPr>
+            <a:picLocks noGrp="1" noChangeAspect="1"/>
+          </p:cNvPicPr>
+          <p:nvPr>
+            <p:ph sz="quarter" idx="1"/>
+          </p:nvPr>
+        </p:nvPicPr>
+        <mc:AlternateContent>
+          <mc:Choice xmlns:ma="http://schemas.microsoft.com/office/mac/drawingml/2008/main" Requires="ma">
+            <p:blipFill>
+              <a:blip r:embed="rId2"/>
+              <a:stretch>
+                <a:fillRect/>
+              </a:stretch>
+            </p:blipFill>
+          </mc:Choice>
+          <mc:Fallback>
+            <p:blipFill>
+              <a:blip r:embed="rId3"/>
+              <a:stretch>
+                <a:fillRect/>
+              </a:stretch>
+            </p:blipFill>
+          </mc:Fallback>
+        </mc:AlternateContent>
+        <p:spPr>
+          <a:xfrm>
+            <a:off x="1209310" y="1600200"/>
+            <a:ext cx="5963380" cy="4873625"/>
+          </a:xfrm>
+        </p:spPr>
+      </p:pic>
+    </p:spTree>
+  </p:cSld>
+  <p:clrMapOvr>
+    <a:masterClrMapping/>
+  </p:clrMapOvr>
+</p:sld>
+</file>
+
+<file path=ppt/slides/slide19.xml><?xml version="1.0" encoding="utf-8"?>
+<p:sld xmlns:a="http://schemas.openxmlformats.org/drawingml/2006/main" xmlns:r="http://schemas.openxmlformats.org/officeDocument/2006/relationships" xmlns:mc="http://schemas.openxmlformats.org/markup-compatibility/2006" xmlns:mv="urn:schemas-microsoft-com:mac:vml" xmlns:p="http://schemas.openxmlformats.org/presentationml/2006/main" mc:Ignorable="mv" mc:PreserveAttributes="mv:*">
+  <p:cSld>
+    <p:spTree>
+      <p:nvGrpSpPr>
+        <p:cNvPr id="1" name=""/>
+        <p:cNvGrpSpPr/>
+        <p:nvPr/>
+      </p:nvGrpSpPr>
+      <p:grpSpPr>
+        <a:xfrm>
+          <a:off x="0" y="0"/>
+          <a:ext cx="0" cy="0"/>
+          <a:chOff x="0" y="0"/>
+          <a:chExt cx="0" cy="0"/>
+        </a:xfrm>
+      </p:grpSpPr>
+      <p:sp>
+        <p:nvSpPr>
+          <p:cNvPr id="2" name="Title 1"/>
+          <p:cNvSpPr>
+            <a:spLocks noGrp="1"/>
+          </p:cNvSpPr>
+          <p:nvPr>
+            <p:ph type="title"/>
+          </p:nvPr>
+        </p:nvSpPr>
+        <p:spPr/>
+        <p:txBody>
+          <a:bodyPr/>
+          <a:lstStyle/>
+          <a:p>
+            <a:r>
+              <a:rPr lang="en-US" smtClean="0"/>
+              <a:t>Telemetry </a:t>
+            </a:r>
+            <a:r>
+              <a:rPr lang="en-US" smtClean="0"/>
+              <a:t>Network (</a:t>
+            </a:r>
+            <a:r>
+              <a:rPr lang="en-US" dirty="0" smtClean="0"/>
+              <a:t>Actual)</a:t>
+            </a:r>
+            <a:endParaRPr lang="en-US" dirty="0"/>
+          </a:p>
+        </p:txBody>
+      </p:sp>
+      <p:pic>
+        <p:nvPicPr>
+          <p:cNvPr id="8" name="Content Placeholder 7" descr="livestatusreq.eps"/>
           <p:cNvPicPr>
             <a:picLocks noGrp="1" noChangeAspect="1"/>
           </p:cNvPicPr>
@@ -6111,6 +6493,707 @@
 </p:sld>
 </file>
 
+<file path=ppt/slides/slide20.xml><?xml version="1.0" encoding="utf-8"?>
+<p:sld xmlns:a="http://schemas.openxmlformats.org/drawingml/2006/main" xmlns:r="http://schemas.openxmlformats.org/officeDocument/2006/relationships" xmlns:mc="http://schemas.openxmlformats.org/markup-compatibility/2006" xmlns:mv="urn:schemas-microsoft-com:mac:vml" xmlns:p="http://schemas.openxmlformats.org/presentationml/2006/main" mc:Ignorable="mv" mc:PreserveAttributes="mv:*">
+  <p:cSld>
+    <p:spTree>
+      <p:nvGrpSpPr>
+        <p:cNvPr id="1" name=""/>
+        <p:cNvGrpSpPr/>
+        <p:nvPr/>
+      </p:nvGrpSpPr>
+      <p:grpSpPr>
+        <a:xfrm>
+          <a:off x="0" y="0"/>
+          <a:ext cx="0" cy="0"/>
+          <a:chOff x="0" y="0"/>
+          <a:chExt cx="0" cy="0"/>
+        </a:xfrm>
+      </p:grpSpPr>
+      <p:sp>
+        <p:nvSpPr>
+          <p:cNvPr id="2" name="Title 1"/>
+          <p:cNvSpPr>
+            <a:spLocks noGrp="1"/>
+          </p:cNvSpPr>
+          <p:nvPr>
+            <p:ph type="title"/>
+          </p:nvPr>
+        </p:nvSpPr>
+        <p:spPr/>
+        <p:txBody>
+          <a:bodyPr/>
+          <a:lstStyle/>
+          <a:p>
+            <a:r>
+              <a:rPr lang="en-US" dirty="0" smtClean="0"/>
+              <a:t>Legacy providers</a:t>
+            </a:r>
+            <a:endParaRPr lang="en-US" dirty="0"/>
+          </a:p>
+        </p:txBody>
+      </p:sp>
+      <p:sp>
+        <p:nvSpPr>
+          <p:cNvPr id="3" name="Content Placeholder 2"/>
+          <p:cNvSpPr>
+            <a:spLocks noGrp="1"/>
+          </p:cNvSpPr>
+          <p:nvPr>
+            <p:ph sz="quarter" idx="1"/>
+          </p:nvPr>
+        </p:nvSpPr>
+        <p:spPr/>
+        <p:txBody>
+          <a:bodyPr>
+            <a:normAutofit fontScale="62500" lnSpcReduction="20000"/>
+          </a:bodyPr>
+          <a:lstStyle/>
+          <a:p>
+            <a:r>
+              <a:rPr lang="en-US" dirty="0" smtClean="0"/>
+              <a:t>These provide status information on demand via </a:t>
+            </a:r>
+            <a:r>
+              <a:rPr lang="en-US" i="1" dirty="0" err="1" smtClean="0"/>
+              <a:t>GET_STATUSImpl</a:t>
+            </a:r>
+            <a:r>
+              <a:rPr lang="en-US" i="1" dirty="0" smtClean="0"/>
+              <a:t> </a:t>
+            </a:r>
+            <a:r>
+              <a:rPr lang="en-US" dirty="0" smtClean="0"/>
+              <a:t>invoked from </a:t>
+            </a:r>
+            <a:r>
+              <a:rPr lang="en-US" dirty="0" err="1" smtClean="0"/>
+              <a:t>CtrlServer</a:t>
+            </a:r>
+            <a:r>
+              <a:rPr lang="en-US" dirty="0" smtClean="0"/>
+              <a:t> on port 9110 </a:t>
+            </a:r>
+            <a:r>
+              <a:rPr lang="en-US" dirty="0" smtClean="0"/>
+              <a:t>on receiving </a:t>
+            </a:r>
+            <a:r>
+              <a:rPr lang="en-US" dirty="0" smtClean="0"/>
+              <a:t>a command of one of the classes:-			</a:t>
+            </a:r>
+          </a:p>
+          <a:p>
+            <a:pPr lvl="1"/>
+            <a:r>
+              <a:rPr lang="en-US" i="1" dirty="0" err="1" smtClean="0"/>
+              <a:t>ngat.message.GUI_RCS.GET_STATUS</a:t>
+            </a:r>
+            <a:r>
+              <a:rPr lang="en-US" i="1" dirty="0" smtClean="0"/>
+              <a:t> </a:t>
+            </a:r>
+          </a:p>
+          <a:p>
+            <a:pPr lvl="1"/>
+            <a:r>
+              <a:rPr lang="en-US" i="1" dirty="0" smtClean="0"/>
+              <a:t>also </a:t>
+            </a:r>
+            <a:r>
+              <a:rPr lang="en-US" i="1" dirty="0" smtClean="0"/>
+              <a:t>GET_STATE_MODEL</a:t>
+            </a:r>
+            <a:r>
+              <a:rPr lang="en-US" dirty="0" smtClean="0"/>
+              <a:t>, ID and </a:t>
+            </a:r>
+            <a:r>
+              <a:rPr lang="en-US" i="1" dirty="0" smtClean="0"/>
+              <a:t>GET_SEEING</a:t>
+            </a:r>
+            <a:r>
+              <a:rPr lang="en-US" dirty="0" smtClean="0"/>
+              <a:t>.</a:t>
+            </a:r>
+          </a:p>
+          <a:p>
+            <a:r>
+              <a:rPr lang="en-US" dirty="0" smtClean="0"/>
+              <a:t>They are attached to various raw telemetry providers (new architecture) as listeners </a:t>
+            </a:r>
+            <a:r>
+              <a:rPr lang="en-US" dirty="0" err="1" smtClean="0"/>
+              <a:t>i.e</a:t>
+            </a:r>
+            <a:r>
+              <a:rPr lang="en-US" dirty="0" smtClean="0"/>
+              <a:t> as various types of </a:t>
+            </a:r>
+            <a:r>
+              <a:rPr lang="en-US" dirty="0" err="1" smtClean="0"/>
+              <a:t>XListener</a:t>
+            </a:r>
+            <a:r>
+              <a:rPr lang="en-US" dirty="0" smtClean="0"/>
+              <a:t>.</a:t>
+            </a:r>
+            <a:r>
+              <a:rPr lang="en-US" dirty="0" smtClean="0"/>
+              <a:t> </a:t>
+            </a:r>
+          </a:p>
+          <a:p>
+            <a:pPr lvl="1"/>
+            <a:r>
+              <a:rPr lang="en-US" dirty="0" smtClean="0"/>
+              <a:t>In </a:t>
+            </a:r>
+            <a:r>
+              <a:rPr lang="en-US" dirty="0" smtClean="0"/>
+              <a:t>the case of the TCS providers this is via another hop as it still utilizes the legacy </a:t>
+            </a:r>
+            <a:r>
+              <a:rPr lang="en-US" dirty="0" err="1" smtClean="0"/>
+              <a:t>StatusPool</a:t>
+            </a:r>
+            <a:r>
+              <a:rPr lang="en-US" dirty="0" smtClean="0"/>
+              <a:t>. (see TCM </a:t>
+            </a:r>
+            <a:r>
+              <a:rPr lang="en-US" dirty="0" smtClean="0"/>
+              <a:t>document).</a:t>
+            </a:r>
+          </a:p>
+          <a:p>
+            <a:r>
+              <a:rPr lang="en-US" dirty="0" err="1" smtClean="0"/>
+              <a:t>ngat.rcs.scm.collation.StatusPoolProvider</a:t>
+            </a:r>
+            <a:endParaRPr lang="en-US" dirty="0" smtClean="0"/>
+          </a:p>
+          <a:p>
+            <a:pPr lvl="1"/>
+            <a:r>
+              <a:rPr lang="en-US" dirty="0" err="1" smtClean="0"/>
+              <a:t>TCS_Status.Segment</a:t>
+            </a:r>
+            <a:endParaRPr lang="en-US" dirty="0" smtClean="0"/>
+          </a:p>
+          <a:p>
+            <a:r>
+              <a:rPr lang="en-US" dirty="0" err="1" smtClean="0"/>
+              <a:t>ngat.rcs.scm.collation.InstrumentStatusProvider</a:t>
+            </a:r>
+            <a:endParaRPr lang="en-US" dirty="0" smtClean="0"/>
+          </a:p>
+          <a:p>
+            <a:pPr lvl="1"/>
+            <a:r>
+              <a:rPr lang="en-US" dirty="0" err="1" smtClean="0"/>
+              <a:t>InstrumentStatus</a:t>
+            </a:r>
+            <a:r>
+              <a:rPr lang="en-US" dirty="0" smtClean="0"/>
+              <a:t>.</a:t>
+            </a:r>
+          </a:p>
+          <a:p>
+            <a:r>
+              <a:rPr lang="en-US" dirty="0" err="1" smtClean="0"/>
+              <a:t>ngat.rcs.scm.collation.BcsCloudStatusProvider</a:t>
+            </a:r>
+            <a:endParaRPr lang="en-US" dirty="0" smtClean="0"/>
+          </a:p>
+          <a:p>
+            <a:pPr lvl="1"/>
+            <a:r>
+              <a:rPr lang="en-US" dirty="0" err="1" smtClean="0"/>
+              <a:t>MappedStatusCategory</a:t>
+            </a:r>
+            <a:endParaRPr lang="en-US" dirty="0" smtClean="0"/>
+          </a:p>
+          <a:p>
+            <a:r>
+              <a:rPr lang="en-US" dirty="0" err="1" smtClean="0"/>
+              <a:t>ngat.rcs.scm.collation.TngDustStatusProvider</a:t>
+            </a:r>
+            <a:endParaRPr lang="en-US" dirty="0" smtClean="0"/>
+          </a:p>
+          <a:p>
+            <a:pPr lvl="1"/>
+            <a:r>
+              <a:rPr lang="en-US" dirty="0" err="1" smtClean="0"/>
+              <a:t>MappedStatusCategory</a:t>
+            </a:r>
+            <a:endParaRPr lang="en-US" dirty="0" smtClean="0"/>
+          </a:p>
+          <a:p>
+            <a:r>
+              <a:rPr lang="en-US" dirty="0" err="1" smtClean="0"/>
+              <a:t>ngat.rcs.scm.collation.AgActiveProvider</a:t>
+            </a:r>
+            <a:endParaRPr lang="en-US" dirty="0" smtClean="0"/>
+          </a:p>
+          <a:p>
+            <a:pPr lvl="1"/>
+            <a:r>
+              <a:rPr lang="en-US" dirty="0" err="1" smtClean="0"/>
+              <a:t>AgActiveStatus</a:t>
+            </a:r>
+            <a:endParaRPr lang="en-US" dirty="0" smtClean="0"/>
+          </a:p>
+          <a:p>
+            <a:r>
+              <a:rPr lang="en-US" dirty="0" err="1" smtClean="0"/>
+              <a:t>ngat.rcs.scm.collation.SkyModelProvider</a:t>
+            </a:r>
+            <a:endParaRPr lang="en-US" dirty="0" smtClean="0"/>
+          </a:p>
+          <a:p>
+            <a:pPr lvl="1"/>
+            <a:r>
+              <a:rPr lang="en-US" dirty="0" err="1" smtClean="0"/>
+              <a:t>SeeingHistoryStatus</a:t>
+            </a:r>
+            <a:endParaRPr lang="en-US" dirty="0" smtClean="0"/>
+          </a:p>
+          <a:p>
+            <a:endParaRPr lang="en-US" dirty="0"/>
+          </a:p>
+        </p:txBody>
+      </p:sp>
+    </p:spTree>
+  </p:cSld>
+  <p:clrMapOvr>
+    <a:masterClrMapping/>
+  </p:clrMapOvr>
+</p:sld>
+</file>
+
+<file path=ppt/slides/slide21.xml><?xml version="1.0" encoding="utf-8"?>
+<p:sld xmlns:a="http://schemas.openxmlformats.org/drawingml/2006/main" xmlns:r="http://schemas.openxmlformats.org/officeDocument/2006/relationships" xmlns:mc="http://schemas.openxmlformats.org/markup-compatibility/2006" xmlns:mv="urn:schemas-microsoft-com:mac:vml" xmlns:p="http://schemas.openxmlformats.org/presentationml/2006/main" mc:Ignorable="mv" mc:PreserveAttributes="mv:*">
+  <p:cSld>
+    <p:spTree>
+      <p:nvGrpSpPr>
+        <p:cNvPr id="1" name=""/>
+        <p:cNvGrpSpPr/>
+        <p:nvPr/>
+      </p:nvGrpSpPr>
+      <p:grpSpPr>
+        <a:xfrm>
+          <a:off x="0" y="0"/>
+          <a:ext cx="0" cy="0"/>
+          <a:chOff x="0" y="0"/>
+          <a:chExt cx="0" cy="0"/>
+        </a:xfrm>
+      </p:grpSpPr>
+      <p:sp>
+        <p:nvSpPr>
+          <p:cNvPr id="2" name="Title 1"/>
+          <p:cNvSpPr>
+            <a:spLocks noGrp="1"/>
+          </p:cNvSpPr>
+          <p:nvPr>
+            <p:ph type="title"/>
+          </p:nvPr>
+        </p:nvSpPr>
+        <p:spPr/>
+        <p:txBody>
+          <a:bodyPr/>
+          <a:lstStyle/>
+          <a:p>
+            <a:r>
+              <a:rPr lang="en-US" dirty="0" smtClean="0"/>
+              <a:t>Gateways</a:t>
+            </a:r>
+            <a:endParaRPr lang="en-US" dirty="0"/>
+          </a:p>
+        </p:txBody>
+      </p:sp>
+      <p:sp>
+        <p:nvSpPr>
+          <p:cNvPr id="3" name="Content Placeholder 2"/>
+          <p:cNvSpPr>
+            <a:spLocks noGrp="1"/>
+          </p:cNvSpPr>
+          <p:nvPr>
+            <p:ph sz="quarter" idx="1"/>
+          </p:nvPr>
+        </p:nvSpPr>
+        <p:spPr/>
+        <p:txBody>
+          <a:bodyPr>
+            <a:normAutofit fontScale="92500" lnSpcReduction="20000"/>
+          </a:bodyPr>
+          <a:lstStyle/>
+          <a:p>
+            <a:r>
+              <a:rPr lang="en-US" dirty="0" smtClean="0"/>
+              <a:t>The various archive-gateways are mostly in the package </a:t>
+            </a:r>
+            <a:r>
+              <a:rPr lang="en-US" i="1" dirty="0" err="1" smtClean="0"/>
+              <a:t>ngat.rcs.telemetry</a:t>
+            </a:r>
+            <a:r>
+              <a:rPr lang="en-US" dirty="0" smtClean="0"/>
+              <a:t>.</a:t>
+            </a:r>
+          </a:p>
+          <a:p>
+            <a:pPr lvl="1"/>
+            <a:r>
+              <a:rPr lang="en-US" i="1" dirty="0" err="1" smtClean="0"/>
+              <a:t>InstrumentArchiveGateway</a:t>
+            </a:r>
+            <a:endParaRPr lang="en-US" i="1" dirty="0" smtClean="0"/>
+          </a:p>
+          <a:p>
+            <a:pPr lvl="1"/>
+            <a:r>
+              <a:rPr lang="en-US" i="1" dirty="0" err="1" smtClean="0"/>
+              <a:t>MeteorologyArchiveGateway</a:t>
+            </a:r>
+            <a:endParaRPr lang="en-US" i="1" dirty="0" smtClean="0"/>
+          </a:p>
+          <a:p>
+            <a:pPr lvl="1"/>
+            <a:r>
+              <a:rPr lang="en-US" i="1" dirty="0" err="1" smtClean="0"/>
+              <a:t>OperationsArchiveGateway</a:t>
+            </a:r>
+            <a:endParaRPr lang="en-US" i="1" dirty="0" smtClean="0"/>
+          </a:p>
+          <a:p>
+            <a:pPr lvl="1"/>
+            <a:r>
+              <a:rPr lang="en-US" i="1" dirty="0" err="1" smtClean="0"/>
+              <a:t>ReactiveSystemArchiveGateway</a:t>
+            </a:r>
+            <a:endParaRPr lang="en-US" i="1" dirty="0" smtClean="0"/>
+          </a:p>
+          <a:p>
+            <a:pPr lvl="1"/>
+            <a:r>
+              <a:rPr lang="en-US" i="1" dirty="0" err="1" smtClean="0"/>
+              <a:t>SkyModelArchiveGateway</a:t>
+            </a:r>
+            <a:endParaRPr lang="en-US" i="1" dirty="0" smtClean="0"/>
+          </a:p>
+          <a:p>
+            <a:pPr lvl="1"/>
+            <a:r>
+              <a:rPr lang="en-US" i="1" dirty="0" err="1" smtClean="0"/>
+              <a:t>StateModelArchiveGateway</a:t>
+            </a:r>
+            <a:endParaRPr lang="en-US" i="1" dirty="0" smtClean="0"/>
+          </a:p>
+          <a:p>
+            <a:pPr lvl="1"/>
+            <a:r>
+              <a:rPr lang="en-US" i="1" dirty="0" err="1" smtClean="0"/>
+              <a:t>TaskArchiveGateway</a:t>
+            </a:r>
+            <a:endParaRPr lang="en-US" i="1" dirty="0" smtClean="0"/>
+          </a:p>
+          <a:p>
+            <a:pPr lvl="1"/>
+            <a:r>
+              <a:rPr lang="en-US" i="1" dirty="0" err="1" smtClean="0"/>
+              <a:t>TelescopeArchiveGateway</a:t>
+            </a:r>
+            <a:endParaRPr lang="en-US" i="1" dirty="0" smtClean="0"/>
+          </a:p>
+          <a:p>
+            <a:r>
+              <a:rPr lang="en-US" dirty="0" smtClean="0"/>
+              <a:t>Scheduler status archive is in the package </a:t>
+            </a:r>
+            <a:r>
+              <a:rPr lang="en-US" i="1" dirty="0" err="1" smtClean="0"/>
+              <a:t>ngat.sms</a:t>
+            </a:r>
+            <a:r>
+              <a:rPr lang="en-US" dirty="0" smtClean="0"/>
+              <a:t>.</a:t>
+            </a:r>
+          </a:p>
+          <a:p>
+            <a:pPr lvl="2"/>
+            <a:r>
+              <a:rPr lang="en-US" dirty="0" smtClean="0">
+                <a:latin typeface="Optima"/>
+                <a:cs typeface="Optima"/>
+              </a:rPr>
+              <a:t>public class </a:t>
+            </a:r>
+            <a:r>
+              <a:rPr lang="en-US" dirty="0" err="1" smtClean="0">
+                <a:latin typeface="Optima"/>
+                <a:cs typeface="Optima"/>
+              </a:rPr>
+              <a:t>SchedulingArchiveGateway</a:t>
+            </a:r>
+            <a:r>
+              <a:rPr lang="en-US" dirty="0" smtClean="0">
+                <a:latin typeface="Optima"/>
+                <a:cs typeface="Optima"/>
+              </a:rPr>
+              <a:t> extends </a:t>
+            </a:r>
+            <a:r>
+              <a:rPr lang="en-US" dirty="0" err="1" smtClean="0">
+                <a:latin typeface="Optima"/>
+                <a:cs typeface="Optima"/>
+              </a:rPr>
+              <a:t>UnicastRemoteObject</a:t>
+            </a:r>
+            <a:r>
+              <a:rPr lang="en-US" dirty="0" smtClean="0">
+                <a:latin typeface="Optima"/>
+                <a:cs typeface="Optima"/>
+              </a:rPr>
+              <a:t> </a:t>
+            </a:r>
+            <a:r>
+              <a:rPr lang="en-US" dirty="0" smtClean="0">
+                <a:latin typeface="Optima"/>
+                <a:cs typeface="Optima"/>
+              </a:rPr>
+              <a:t>implements</a:t>
+            </a:r>
+          </a:p>
+          <a:p>
+            <a:pPr lvl="3"/>
+            <a:r>
+              <a:rPr lang="en-US" dirty="0" err="1" smtClean="0">
+                <a:latin typeface="Optima"/>
+                <a:cs typeface="Optima"/>
+              </a:rPr>
+              <a:t>SchedulingStatusUpdateListener</a:t>
+            </a:r>
+            <a:r>
+              <a:rPr lang="en-US" dirty="0" smtClean="0">
+                <a:latin typeface="Optima"/>
+                <a:cs typeface="Optima"/>
+              </a:rPr>
+              <a:t>,</a:t>
+            </a:r>
+          </a:p>
+          <a:p>
+            <a:pPr lvl="3"/>
+            <a:r>
+              <a:rPr lang="en-US" dirty="0" err="1" smtClean="0">
+                <a:latin typeface="Optima"/>
+                <a:cs typeface="Optima"/>
+              </a:rPr>
+              <a:t>SchedulingStatusProvider</a:t>
+            </a:r>
+            <a:r>
+              <a:rPr lang="en-US" dirty="0" smtClean="0">
+                <a:latin typeface="Optima"/>
+                <a:cs typeface="Optima"/>
+              </a:rPr>
+              <a:t>,</a:t>
+            </a:r>
+            <a:r>
+              <a:rPr lang="en-US" dirty="0" smtClean="0">
+                <a:latin typeface="Optima"/>
+                <a:cs typeface="Optima"/>
+              </a:rPr>
+              <a:t> </a:t>
+            </a:r>
+          </a:p>
+          <a:p>
+            <a:pPr lvl="3"/>
+            <a:r>
+              <a:rPr lang="en-US" dirty="0" err="1" smtClean="0">
+                <a:latin typeface="Optima"/>
+                <a:cs typeface="Optima"/>
+              </a:rPr>
+              <a:t>SchedulingStatusArchive</a:t>
+            </a:r>
+            <a:r>
+              <a:rPr lang="en-US" dirty="0" smtClean="0">
+                <a:latin typeface="Optima"/>
+                <a:cs typeface="Optima"/>
+              </a:rPr>
+              <a:t> </a:t>
+            </a:r>
+          </a:p>
+        </p:txBody>
+      </p:sp>
+    </p:spTree>
+  </p:cSld>
+  <p:clrMapOvr>
+    <a:masterClrMapping/>
+  </p:clrMapOvr>
+</p:sld>
+</file>
+
+<file path=ppt/slides/slide22.xml><?xml version="1.0" encoding="utf-8"?>
+<p:sld xmlns:a="http://schemas.openxmlformats.org/drawingml/2006/main" xmlns:r="http://schemas.openxmlformats.org/officeDocument/2006/relationships" xmlns:mc="http://schemas.openxmlformats.org/markup-compatibility/2006" xmlns:mv="urn:schemas-microsoft-com:mac:vml" xmlns:p="http://schemas.openxmlformats.org/presentationml/2006/main" mc:Ignorable="mv" mc:PreserveAttributes="mv:*">
+  <p:cSld>
+    <p:spTree>
+      <p:nvGrpSpPr>
+        <p:cNvPr id="1" name=""/>
+        <p:cNvGrpSpPr/>
+        <p:nvPr/>
+      </p:nvGrpSpPr>
+      <p:grpSpPr>
+        <a:xfrm>
+          <a:off x="0" y="0"/>
+          <a:ext cx="0" cy="0"/>
+          <a:chOff x="0" y="0"/>
+          <a:chExt cx="0" cy="0"/>
+        </a:xfrm>
+      </p:grpSpPr>
+      <p:sp>
+        <p:nvSpPr>
+          <p:cNvPr id="2" name="Title 1"/>
+          <p:cNvSpPr>
+            <a:spLocks noGrp="1"/>
+          </p:cNvSpPr>
+          <p:nvPr>
+            <p:ph type="title"/>
+          </p:nvPr>
+        </p:nvSpPr>
+        <p:spPr/>
+        <p:txBody>
+          <a:bodyPr/>
+          <a:lstStyle/>
+          <a:p>
+            <a:r>
+              <a:rPr lang="en-US" dirty="0" smtClean="0"/>
+              <a:t>Gateway Operation</a:t>
+            </a:r>
+            <a:endParaRPr lang="en-US" dirty="0"/>
+          </a:p>
+        </p:txBody>
+      </p:sp>
+      <p:sp>
+        <p:nvSpPr>
+          <p:cNvPr id="3" name="Content Placeholder 2"/>
+          <p:cNvSpPr>
+            <a:spLocks noGrp="1"/>
+          </p:cNvSpPr>
+          <p:nvPr>
+            <p:ph sz="quarter" idx="1"/>
+          </p:nvPr>
+        </p:nvSpPr>
+        <p:spPr/>
+        <p:txBody>
+          <a:bodyPr>
+            <a:normAutofit fontScale="70000" lnSpcReduction="20000"/>
+          </a:bodyPr>
+          <a:lstStyle/>
+          <a:p>
+            <a:r>
+              <a:rPr lang="en-US" dirty="0" smtClean="0"/>
+              <a:t>Gateways accept incoming status from the raw source and store the data in a live-cache i.e. a FIFO queue.</a:t>
+            </a:r>
+          </a:p>
+          <a:p>
+            <a:r>
+              <a:rPr lang="en-US" dirty="0" smtClean="0"/>
+              <a:t>Data older than a specified age is dumped to a secondary cache. </a:t>
+            </a:r>
+          </a:p>
+          <a:p>
+            <a:r>
+              <a:rPr lang="en-US" dirty="0" smtClean="0"/>
+              <a:t>This may be null in which case the data is lost.</a:t>
+            </a:r>
+          </a:p>
+          <a:p>
+            <a:r>
+              <a:rPr lang="en-US" dirty="0" smtClean="0"/>
+              <a:t>The archive aspect of the gateway allows external clients to retrieve historic data – this should be from the secondary cache if one exists.</a:t>
+            </a:r>
+          </a:p>
+          <a:p>
+            <a:r>
+              <a:rPr lang="en-US" dirty="0" smtClean="0"/>
+              <a:t>This is an aspect which has not really been addressed yet.</a:t>
+            </a:r>
+          </a:p>
+          <a:p>
+            <a:r>
+              <a:rPr lang="en-US" dirty="0" smtClean="0"/>
+              <a:t>For (the only) example of a secondary cache see:-</a:t>
+            </a:r>
+          </a:p>
+          <a:p>
+            <a:pPr lvl="1"/>
+            <a:r>
+              <a:rPr lang="en-US" i="1" dirty="0" err="1" smtClean="0"/>
+              <a:t>ngat.rcs.telemetry.InstrumentBackingStoreHelper</a:t>
+            </a:r>
+            <a:endParaRPr lang="en-US" dirty="0" smtClean="0"/>
+          </a:p>
+          <a:p>
+            <a:r>
+              <a:rPr lang="en-US" dirty="0" smtClean="0"/>
+              <a:t>The gateways operate a processing thread, the function of which follows this template.</a:t>
+            </a:r>
+          </a:p>
+          <a:p>
+            <a:pPr>
+              <a:buNone/>
+            </a:pPr>
+            <a:r>
+              <a:rPr lang="en-US" dirty="0" smtClean="0"/>
+              <a:t>	Repeat forever {</a:t>
+            </a:r>
+          </a:p>
+          <a:p>
+            <a:pPr lvl="1"/>
+            <a:r>
+              <a:rPr lang="en-US" dirty="0" smtClean="0"/>
+              <a:t>Sleep (interval)</a:t>
+            </a:r>
+          </a:p>
+          <a:p>
+            <a:pPr lvl="1"/>
+            <a:r>
+              <a:rPr lang="en-US" dirty="0" smtClean="0"/>
+              <a:t>Cull aged items to backing store (if any)</a:t>
+            </a:r>
+          </a:p>
+          <a:p>
+            <a:pPr lvl="1"/>
+            <a:r>
+              <a:rPr lang="en-US" dirty="0" smtClean="0"/>
+              <a:t>Process pending statuses, send to subscribers</a:t>
+            </a:r>
+          </a:p>
+          <a:p>
+            <a:pPr>
+              <a:buNone/>
+            </a:pPr>
+            <a:r>
+              <a:rPr lang="en-US" dirty="0" smtClean="0"/>
+              <a:t>	}</a:t>
+            </a:r>
+          </a:p>
+          <a:p>
+            <a:pPr>
+              <a:buNone/>
+            </a:pPr>
+            <a:endParaRPr lang="en-US" dirty="0"/>
+          </a:p>
+        </p:txBody>
+      </p:sp>
+    </p:spTree>
+  </p:cSld>
+  <p:clrMapOvr>
+    <a:masterClrMapping/>
+  </p:clrMapOvr>
+</p:sld>
+</file>
+
 <file path=ppt/slides/slide3.xml><?xml version="1.0" encoding="utf-8"?>
 <p:sld xmlns:a="http://schemas.openxmlformats.org/drawingml/2006/main" xmlns:r="http://schemas.openxmlformats.org/officeDocument/2006/relationships" xmlns:mc="http://schemas.openxmlformats.org/markup-compatibility/2006" xmlns:mv="urn:schemas-microsoft-com:mac:vml" xmlns:p="http://schemas.openxmlformats.org/presentationml/2006/main" mc:Ignorable="mv" mc:PreserveAttributes="mv:*">
   <p:cSld>
@@ -6583,7 +7666,7 @@
         <p:spPr/>
         <p:txBody>
           <a:bodyPr>
-            <a:normAutofit fontScale="70000" lnSpcReduction="20000"/>
+            <a:normAutofit fontScale="62500" lnSpcReduction="20000"/>
           </a:bodyPr>
           <a:lstStyle/>
           <a:p>
@@ -6656,7 +7739,11 @@
           <a:p>
             <a:r>
               <a:rPr lang="en-US" dirty="0" smtClean="0"/>
-              <a:t>Providers obtain their statuses in various ways:-</a:t>
+              <a:t>Providers (running within the RCS) </a:t>
+            </a:r>
+            <a:r>
+              <a:rPr lang="en-US" dirty="0" smtClean="0"/>
+              <a:t>obtain their statuses in various ways:-</a:t>
             </a:r>
           </a:p>
           <a:p>
@@ -6714,11 +7801,44 @@
               <a:rPr lang="en-US" dirty="0" smtClean="0"/>
               <a:t>)</a:t>
             </a:r>
-          </a:p>
-          <a:p>
-            <a:r>
-              <a:rPr lang="en-US" dirty="0" smtClean="0"/>
-              <a:t>Most of these providers are now defunct due to the way in which status information is collated within the RCS now using TCM, ICM, EMS.</a:t>
+            <a:endParaRPr lang="en-US" dirty="0" smtClean="0"/>
+          </a:p>
+          <a:p>
+            <a:r>
+              <a:rPr lang="en-US" dirty="0" smtClean="0"/>
+              <a:t>T</a:t>
+            </a:r>
+            <a:r>
+              <a:rPr lang="en-US" dirty="0" smtClean="0"/>
+              <a:t>hese </a:t>
+            </a:r>
+            <a:r>
+              <a:rPr lang="en-US" dirty="0" smtClean="0"/>
+              <a:t>providers are now defunct due to the way in which status information is collated within the RCS now using TCM, ICM, </a:t>
+            </a:r>
+            <a:r>
+              <a:rPr lang="en-US" dirty="0" smtClean="0"/>
+              <a:t>EMS, ERS, OPS.</a:t>
+            </a:r>
+          </a:p>
+          <a:p>
+            <a:r>
+              <a:rPr lang="en-US" dirty="0" smtClean="0"/>
+              <a:t>However a set of legacy providers are still required to serve </a:t>
+            </a:r>
+            <a:r>
+              <a:rPr lang="en-US" dirty="0" err="1" smtClean="0"/>
+              <a:t>LiveStatus</a:t>
+            </a:r>
+            <a:r>
+              <a:rPr lang="en-US" dirty="0" smtClean="0"/>
+              <a:t>.</a:t>
+            </a:r>
+          </a:p>
+          <a:p>
+            <a:r>
+              <a:rPr lang="en-US" dirty="0" smtClean="0"/>
+              <a:t>These are connected to the new telemetry feed sources.</a:t>
             </a:r>
           </a:p>
           <a:p>
@@ -6776,7 +7896,7 @@
       </p:sp>
       <p:pic>
         <p:nvPicPr>
-          <p:cNvPr id="4" name="Content Placeholder 3" descr="status_legacy_general.eps"/>
+          <p:cNvPr id="6" name="Content Placeholder 5" descr="status_legacy_general.eps"/>
           <p:cNvPicPr>
             <a:picLocks noGrp="1" noChangeAspect="1"/>
           </p:cNvPicPr>
@@ -6851,7 +7971,11 @@
           <a:p>
             <a:r>
               <a:rPr lang="en-US" dirty="0" smtClean="0"/>
-              <a:t>Old Providers</a:t>
+              <a:t>Old </a:t>
+            </a:r>
+            <a:r>
+              <a:rPr lang="en-US" dirty="0" smtClean="0"/>
+              <a:t>Providers</a:t>
             </a:r>
             <a:endParaRPr lang="en-US" dirty="0"/>
           </a:p>
@@ -6874,7 +7998,17 @@
           <a:p>
             <a:r>
               <a:rPr lang="en-US" dirty="0" smtClean="0"/>
-              <a:t>Mostly in </a:t>
+              <a:t>Only of historic interest.</a:t>
+            </a:r>
+          </a:p>
+          <a:p>
+            <a:r>
+              <a:rPr lang="en-US" dirty="0" smtClean="0"/>
+              <a:t>Mostly </a:t>
+            </a:r>
+            <a:r>
+              <a:rPr lang="en-US" dirty="0" smtClean="0"/>
+              <a:t>in </a:t>
             </a:r>
             <a:r>
               <a:rPr lang="en-US" dirty="0" err="1" smtClean="0"/>
@@ -7007,15 +8141,7 @@
           <a:p>
             <a:r>
               <a:rPr lang="en-US" dirty="0" smtClean="0"/>
-              <a:t>Now</a:t>
-            </a:r>
-            <a:r>
-              <a:rPr lang="en-US" dirty="0" smtClean="0"/>
-              <a:t> ALL </a:t>
-            </a:r>
-            <a:r>
-              <a:rPr lang="en-US" dirty="0" smtClean="0"/>
-              <a:t>defunct.</a:t>
+              <a:t>Now ALL defunct.</a:t>
             </a:r>
           </a:p>
         </p:txBody>
@@ -7141,8 +8267,40 @@
           <a:p>
             <a:r>
               <a:rPr lang="en-US" dirty="0" smtClean="0"/>
-              <a:t>A few pub-sub streams using new architecture. </a:t>
-            </a:r>
+              <a:t>A few pub-sub streams using new architecture</a:t>
+            </a:r>
+            <a:r>
+              <a:rPr lang="en-US" dirty="0" smtClean="0"/>
+              <a:t>.</a:t>
+            </a:r>
+          </a:p>
+          <a:p>
+            <a:pPr lvl="1"/>
+            <a:r>
+              <a:rPr lang="en-US" dirty="0" smtClean="0"/>
+              <a:t>E.g. </a:t>
+            </a:r>
+            <a:r>
+              <a:rPr lang="en-US" dirty="0" err="1" smtClean="0"/>
+              <a:t>SkyModel</a:t>
+            </a:r>
+            <a:r>
+              <a:rPr lang="en-US" dirty="0" smtClean="0"/>
+              <a:t> to </a:t>
+            </a:r>
+            <a:r>
+              <a:rPr lang="en-US" dirty="0" err="1" smtClean="0"/>
+              <a:t>RcsGUI</a:t>
+            </a:r>
+            <a:r>
+              <a:rPr lang="en-US" dirty="0" smtClean="0"/>
+              <a:t>.</a:t>
+            </a:r>
+            <a:r>
+              <a:rPr lang="en-US" dirty="0" smtClean="0"/>
+              <a:t> </a:t>
+            </a:r>
+            <a:endParaRPr lang="en-US" dirty="0" smtClean="0"/>
           </a:p>
           <a:p>
             <a:endParaRPr lang="en-US" dirty="0" smtClean="0"/>

</xml_diff>